<commit_message>
Maintain 1 ER element on at a time
- Won't turn 2 ER elements on at once.
- Clean old DR test files
- Update docs
  - Remove fixed issues
  - Update logic charts with DR signals
</commit_message>
<xml_diff>
--- a/doc/newHeatSourceChoice.pptx
+++ b/doc/newHeatSourceChoice.pptx
@@ -105,6 +105,22 @@
       </a:defRPr>
     </a:lvl9pPr>
   </p:defaultTextStyle>
+  <p:extLst>
+    <p:ext uri="{EFAFB233-063F-42B5-8137-9DF3F51BA10A}">
+      <p15:sldGuideLst xmlns:p15="http://schemas.microsoft.com/office/powerpoint/2012/main">
+        <p15:guide id="1" orient="horz" pos="2160">
+          <p15:clr>
+            <a:srgbClr val="A4A3A4"/>
+          </p15:clr>
+        </p15:guide>
+        <p15:guide id="2" pos="2880">
+          <p15:clr>
+            <a:srgbClr val="A4A3A4"/>
+          </p15:clr>
+        </p15:guide>
+      </p15:sldGuideLst>
+    </p:ext>
+  </p:extLst>
 </p:presentation>
 </file>
 
@@ -146,10 +162,9 @@
           <a:lstStyle/>
           <a:p>
             <a:r>
-              <a:rPr lang="en-US" smtClean="0"/>
+              <a:rPr lang="en-US"/>
               <a:t>Click to edit Master title style</a:t>
             </a:r>
-            <a:endParaRPr lang="en-US"/>
           </a:p>
         </p:txBody>
       </p:sp>
@@ -265,10 +280,9 @@
           </a:lstStyle>
           <a:p>
             <a:r>
-              <a:rPr lang="en-US" smtClean="0"/>
+              <a:rPr lang="en-US"/>
               <a:t>Click to edit Master subtitle style</a:t>
             </a:r>
-            <a:endParaRPr lang="en-US"/>
           </a:p>
         </p:txBody>
       </p:sp>
@@ -289,7 +303,7 @@
           <a:p>
             <a:fld id="{9D7AE3E4-2EE4-4D57-9005-1681787E4578}" type="datetimeFigureOut">
               <a:rPr lang="en-US" smtClean="0"/>
-              <a:t>3/9/2016</a:t>
+              <a:t>10/7/2020</a:t>
             </a:fld>
             <a:endParaRPr lang="en-US"/>
           </a:p>
@@ -383,10 +397,9 @@
           <a:lstStyle/>
           <a:p>
             <a:r>
-              <a:rPr lang="en-US" smtClean="0"/>
+              <a:rPr lang="en-US"/>
               <a:t>Click to edit Master title style</a:t>
             </a:r>
-            <a:endParaRPr lang="en-US"/>
           </a:p>
         </p:txBody>
       </p:sp>
@@ -407,38 +420,37 @@
           <a:p>
             <a:pPr lvl="0"/>
             <a:r>
-              <a:rPr lang="en-US" smtClean="0"/>
+              <a:rPr lang="en-US"/>
               <a:t>Click to edit Master text styles</a:t>
             </a:r>
           </a:p>
           <a:p>
             <a:pPr lvl="1"/>
             <a:r>
-              <a:rPr lang="en-US" smtClean="0"/>
+              <a:rPr lang="en-US"/>
               <a:t>Second level</a:t>
             </a:r>
           </a:p>
           <a:p>
             <a:pPr lvl="2"/>
             <a:r>
-              <a:rPr lang="en-US" smtClean="0"/>
+              <a:rPr lang="en-US"/>
               <a:t>Third level</a:t>
             </a:r>
           </a:p>
           <a:p>
             <a:pPr lvl="3"/>
             <a:r>
-              <a:rPr lang="en-US" smtClean="0"/>
+              <a:rPr lang="en-US"/>
               <a:t>Fourth level</a:t>
             </a:r>
           </a:p>
           <a:p>
             <a:pPr lvl="4"/>
             <a:r>
-              <a:rPr lang="en-US" smtClean="0"/>
+              <a:rPr lang="en-US"/>
               <a:t>Fifth level</a:t>
             </a:r>
-            <a:endParaRPr lang="en-US"/>
           </a:p>
         </p:txBody>
       </p:sp>
@@ -459,7 +471,7 @@
           <a:p>
             <a:fld id="{9D7AE3E4-2EE4-4D57-9005-1681787E4578}" type="datetimeFigureOut">
               <a:rPr lang="en-US" smtClean="0"/>
-              <a:t>3/9/2016</a:t>
+              <a:t>10/7/2020</a:t>
             </a:fld>
             <a:endParaRPr lang="en-US"/>
           </a:p>
@@ -558,10 +570,9 @@
           <a:lstStyle/>
           <a:p>
             <a:r>
-              <a:rPr lang="en-US" smtClean="0"/>
+              <a:rPr lang="en-US"/>
               <a:t>Click to edit Master title style</a:t>
             </a:r>
-            <a:endParaRPr lang="en-US"/>
           </a:p>
         </p:txBody>
       </p:sp>
@@ -587,38 +598,37 @@
           <a:p>
             <a:pPr lvl="0"/>
             <a:r>
-              <a:rPr lang="en-US" smtClean="0"/>
+              <a:rPr lang="en-US"/>
               <a:t>Click to edit Master text styles</a:t>
             </a:r>
           </a:p>
           <a:p>
             <a:pPr lvl="1"/>
             <a:r>
-              <a:rPr lang="en-US" smtClean="0"/>
+              <a:rPr lang="en-US"/>
               <a:t>Second level</a:t>
             </a:r>
           </a:p>
           <a:p>
             <a:pPr lvl="2"/>
             <a:r>
-              <a:rPr lang="en-US" smtClean="0"/>
+              <a:rPr lang="en-US"/>
               <a:t>Third level</a:t>
             </a:r>
           </a:p>
           <a:p>
             <a:pPr lvl="3"/>
             <a:r>
-              <a:rPr lang="en-US" smtClean="0"/>
+              <a:rPr lang="en-US"/>
               <a:t>Fourth level</a:t>
             </a:r>
           </a:p>
           <a:p>
             <a:pPr lvl="4"/>
             <a:r>
-              <a:rPr lang="en-US" smtClean="0"/>
+              <a:rPr lang="en-US"/>
               <a:t>Fifth level</a:t>
             </a:r>
-            <a:endParaRPr lang="en-US"/>
           </a:p>
         </p:txBody>
       </p:sp>
@@ -639,7 +649,7 @@
           <a:p>
             <a:fld id="{9D7AE3E4-2EE4-4D57-9005-1681787E4578}" type="datetimeFigureOut">
               <a:rPr lang="en-US" smtClean="0"/>
-              <a:t>3/9/2016</a:t>
+              <a:t>10/7/2020</a:t>
             </a:fld>
             <a:endParaRPr lang="en-US"/>
           </a:p>
@@ -733,10 +743,9 @@
           <a:lstStyle/>
           <a:p>
             <a:r>
-              <a:rPr lang="en-US" smtClean="0"/>
+              <a:rPr lang="en-US"/>
               <a:t>Click to edit Master title style</a:t>
             </a:r>
-            <a:endParaRPr lang="en-US"/>
           </a:p>
         </p:txBody>
       </p:sp>
@@ -757,38 +766,37 @@
           <a:p>
             <a:pPr lvl="0"/>
             <a:r>
-              <a:rPr lang="en-US" smtClean="0"/>
+              <a:rPr lang="en-US"/>
               <a:t>Click to edit Master text styles</a:t>
             </a:r>
           </a:p>
           <a:p>
             <a:pPr lvl="1"/>
             <a:r>
-              <a:rPr lang="en-US" smtClean="0"/>
+              <a:rPr lang="en-US"/>
               <a:t>Second level</a:t>
             </a:r>
           </a:p>
           <a:p>
             <a:pPr lvl="2"/>
             <a:r>
-              <a:rPr lang="en-US" smtClean="0"/>
+              <a:rPr lang="en-US"/>
               <a:t>Third level</a:t>
             </a:r>
           </a:p>
           <a:p>
             <a:pPr lvl="3"/>
             <a:r>
-              <a:rPr lang="en-US" smtClean="0"/>
+              <a:rPr lang="en-US"/>
               <a:t>Fourth level</a:t>
             </a:r>
           </a:p>
           <a:p>
             <a:pPr lvl="4"/>
             <a:r>
-              <a:rPr lang="en-US" smtClean="0"/>
+              <a:rPr lang="en-US"/>
               <a:t>Fifth level</a:t>
             </a:r>
-            <a:endParaRPr lang="en-US"/>
           </a:p>
         </p:txBody>
       </p:sp>
@@ -809,7 +817,7 @@
           <a:p>
             <a:fld id="{9D7AE3E4-2EE4-4D57-9005-1681787E4578}" type="datetimeFigureOut">
               <a:rPr lang="en-US" smtClean="0"/>
-              <a:t>3/9/2016</a:t>
+              <a:t>10/7/2020</a:t>
             </a:fld>
             <a:endParaRPr lang="en-US"/>
           </a:p>
@@ -912,10 +920,9 @@
           </a:lstStyle>
           <a:p>
             <a:r>
-              <a:rPr lang="en-US" smtClean="0"/>
+              <a:rPr lang="en-US"/>
               <a:t>Click to edit Master title style</a:t>
             </a:r>
-            <a:endParaRPr lang="en-US"/>
           </a:p>
         </p:txBody>
       </p:sp>
@@ -1032,7 +1039,7 @@
           <a:p>
             <a:pPr lvl="0"/>
             <a:r>
-              <a:rPr lang="en-US" smtClean="0"/>
+              <a:rPr lang="en-US"/>
               <a:t>Click to edit Master text styles</a:t>
             </a:r>
           </a:p>
@@ -1055,7 +1062,7 @@
           <a:p>
             <a:fld id="{9D7AE3E4-2EE4-4D57-9005-1681787E4578}" type="datetimeFigureOut">
               <a:rPr lang="en-US" smtClean="0"/>
-              <a:t>3/9/2016</a:t>
+              <a:t>10/7/2020</a:t>
             </a:fld>
             <a:endParaRPr lang="en-US"/>
           </a:p>
@@ -1149,10 +1156,9 @@
           <a:lstStyle/>
           <a:p>
             <a:r>
-              <a:rPr lang="en-US" smtClean="0"/>
+              <a:rPr lang="en-US"/>
               <a:t>Click to edit Master title style</a:t>
             </a:r>
-            <a:endParaRPr lang="en-US"/>
           </a:p>
         </p:txBody>
       </p:sp>
@@ -1206,38 +1212,37 @@
           <a:p>
             <a:pPr lvl="0"/>
             <a:r>
-              <a:rPr lang="en-US" smtClean="0"/>
+              <a:rPr lang="en-US"/>
               <a:t>Click to edit Master text styles</a:t>
             </a:r>
           </a:p>
           <a:p>
             <a:pPr lvl="1"/>
             <a:r>
-              <a:rPr lang="en-US" smtClean="0"/>
+              <a:rPr lang="en-US"/>
               <a:t>Second level</a:t>
             </a:r>
           </a:p>
           <a:p>
             <a:pPr lvl="2"/>
             <a:r>
-              <a:rPr lang="en-US" smtClean="0"/>
+              <a:rPr lang="en-US"/>
               <a:t>Third level</a:t>
             </a:r>
           </a:p>
           <a:p>
             <a:pPr lvl="3"/>
             <a:r>
-              <a:rPr lang="en-US" smtClean="0"/>
+              <a:rPr lang="en-US"/>
               <a:t>Fourth level</a:t>
             </a:r>
           </a:p>
           <a:p>
             <a:pPr lvl="4"/>
             <a:r>
-              <a:rPr lang="en-US" smtClean="0"/>
+              <a:rPr lang="en-US"/>
               <a:t>Fifth level</a:t>
             </a:r>
-            <a:endParaRPr lang="en-US"/>
           </a:p>
         </p:txBody>
       </p:sp>
@@ -1291,38 +1296,37 @@
           <a:p>
             <a:pPr lvl="0"/>
             <a:r>
-              <a:rPr lang="en-US" smtClean="0"/>
+              <a:rPr lang="en-US"/>
               <a:t>Click to edit Master text styles</a:t>
             </a:r>
           </a:p>
           <a:p>
             <a:pPr lvl="1"/>
             <a:r>
-              <a:rPr lang="en-US" smtClean="0"/>
+              <a:rPr lang="en-US"/>
               <a:t>Second level</a:t>
             </a:r>
           </a:p>
           <a:p>
             <a:pPr lvl="2"/>
             <a:r>
-              <a:rPr lang="en-US" smtClean="0"/>
+              <a:rPr lang="en-US"/>
               <a:t>Third level</a:t>
             </a:r>
           </a:p>
           <a:p>
             <a:pPr lvl="3"/>
             <a:r>
-              <a:rPr lang="en-US" smtClean="0"/>
+              <a:rPr lang="en-US"/>
               <a:t>Fourth level</a:t>
             </a:r>
           </a:p>
           <a:p>
             <a:pPr lvl="4"/>
             <a:r>
-              <a:rPr lang="en-US" smtClean="0"/>
+              <a:rPr lang="en-US"/>
               <a:t>Fifth level</a:t>
             </a:r>
-            <a:endParaRPr lang="en-US"/>
           </a:p>
         </p:txBody>
       </p:sp>
@@ -1343,7 +1347,7 @@
           <a:p>
             <a:fld id="{9D7AE3E4-2EE4-4D57-9005-1681787E4578}" type="datetimeFigureOut">
               <a:rPr lang="en-US" smtClean="0"/>
-              <a:t>3/9/2016</a:t>
+              <a:t>10/7/2020</a:t>
             </a:fld>
             <a:endParaRPr lang="en-US"/>
           </a:p>
@@ -1441,10 +1445,9 @@
           </a:lstStyle>
           <a:p>
             <a:r>
-              <a:rPr lang="en-US" smtClean="0"/>
+              <a:rPr lang="en-US"/>
               <a:t>Click to edit Master title style</a:t>
             </a:r>
-            <a:endParaRPr lang="en-US"/>
           </a:p>
         </p:txBody>
       </p:sp>
@@ -1507,7 +1510,7 @@
           <a:p>
             <a:pPr lvl="0"/>
             <a:r>
-              <a:rPr lang="en-US" smtClean="0"/>
+              <a:rPr lang="en-US"/>
               <a:t>Click to edit Master text styles</a:t>
             </a:r>
           </a:p>
@@ -1563,38 +1566,37 @@
           <a:p>
             <a:pPr lvl="0"/>
             <a:r>
-              <a:rPr lang="en-US" smtClean="0"/>
+              <a:rPr lang="en-US"/>
               <a:t>Click to edit Master text styles</a:t>
             </a:r>
           </a:p>
           <a:p>
             <a:pPr lvl="1"/>
             <a:r>
-              <a:rPr lang="en-US" smtClean="0"/>
+              <a:rPr lang="en-US"/>
               <a:t>Second level</a:t>
             </a:r>
           </a:p>
           <a:p>
             <a:pPr lvl="2"/>
             <a:r>
-              <a:rPr lang="en-US" smtClean="0"/>
+              <a:rPr lang="en-US"/>
               <a:t>Third level</a:t>
             </a:r>
           </a:p>
           <a:p>
             <a:pPr lvl="3"/>
             <a:r>
-              <a:rPr lang="en-US" smtClean="0"/>
+              <a:rPr lang="en-US"/>
               <a:t>Fourth level</a:t>
             </a:r>
           </a:p>
           <a:p>
             <a:pPr lvl="4"/>
             <a:r>
-              <a:rPr lang="en-US" smtClean="0"/>
+              <a:rPr lang="en-US"/>
               <a:t>Fifth level</a:t>
             </a:r>
-            <a:endParaRPr lang="en-US"/>
           </a:p>
         </p:txBody>
       </p:sp>
@@ -1657,7 +1659,7 @@
           <a:p>
             <a:pPr lvl="0"/>
             <a:r>
-              <a:rPr lang="en-US" smtClean="0"/>
+              <a:rPr lang="en-US"/>
               <a:t>Click to edit Master text styles</a:t>
             </a:r>
           </a:p>
@@ -1713,38 +1715,37 @@
           <a:p>
             <a:pPr lvl="0"/>
             <a:r>
-              <a:rPr lang="en-US" smtClean="0"/>
+              <a:rPr lang="en-US"/>
               <a:t>Click to edit Master text styles</a:t>
             </a:r>
           </a:p>
           <a:p>
             <a:pPr lvl="1"/>
             <a:r>
-              <a:rPr lang="en-US" smtClean="0"/>
+              <a:rPr lang="en-US"/>
               <a:t>Second level</a:t>
             </a:r>
           </a:p>
           <a:p>
             <a:pPr lvl="2"/>
             <a:r>
-              <a:rPr lang="en-US" smtClean="0"/>
+              <a:rPr lang="en-US"/>
               <a:t>Third level</a:t>
             </a:r>
           </a:p>
           <a:p>
             <a:pPr lvl="3"/>
             <a:r>
-              <a:rPr lang="en-US" smtClean="0"/>
+              <a:rPr lang="en-US"/>
               <a:t>Fourth level</a:t>
             </a:r>
           </a:p>
           <a:p>
             <a:pPr lvl="4"/>
             <a:r>
-              <a:rPr lang="en-US" smtClean="0"/>
+              <a:rPr lang="en-US"/>
               <a:t>Fifth level</a:t>
             </a:r>
-            <a:endParaRPr lang="en-US"/>
           </a:p>
         </p:txBody>
       </p:sp>
@@ -1765,7 +1766,7 @@
           <a:p>
             <a:fld id="{9D7AE3E4-2EE4-4D57-9005-1681787E4578}" type="datetimeFigureOut">
               <a:rPr lang="en-US" smtClean="0"/>
-              <a:t>3/9/2016</a:t>
+              <a:t>10/7/2020</a:t>
             </a:fld>
             <a:endParaRPr lang="en-US"/>
           </a:p>
@@ -1859,10 +1860,9 @@
           <a:lstStyle/>
           <a:p>
             <a:r>
-              <a:rPr lang="en-US" smtClean="0"/>
+              <a:rPr lang="en-US"/>
               <a:t>Click to edit Master title style</a:t>
             </a:r>
-            <a:endParaRPr lang="en-US"/>
           </a:p>
         </p:txBody>
       </p:sp>
@@ -1883,7 +1883,7 @@
           <a:p>
             <a:fld id="{9D7AE3E4-2EE4-4D57-9005-1681787E4578}" type="datetimeFigureOut">
               <a:rPr lang="en-US" smtClean="0"/>
-              <a:t>3/9/2016</a:t>
+              <a:t>10/7/2020</a:t>
             </a:fld>
             <a:endParaRPr lang="en-US"/>
           </a:p>
@@ -1978,7 +1978,7 @@
           <a:p>
             <a:fld id="{9D7AE3E4-2EE4-4D57-9005-1681787E4578}" type="datetimeFigureOut">
               <a:rPr lang="en-US" smtClean="0"/>
-              <a:t>3/9/2016</a:t>
+              <a:t>10/7/2020</a:t>
             </a:fld>
             <a:endParaRPr lang="en-US"/>
           </a:p>
@@ -2081,10 +2081,9 @@
           </a:lstStyle>
           <a:p>
             <a:r>
-              <a:rPr lang="en-US" smtClean="0"/>
+              <a:rPr lang="en-US"/>
               <a:t>Click to edit Master title style</a:t>
             </a:r>
-            <a:endParaRPr lang="en-US"/>
           </a:p>
         </p:txBody>
       </p:sp>
@@ -2138,38 +2137,37 @@
           <a:p>
             <a:pPr lvl="0"/>
             <a:r>
-              <a:rPr lang="en-US" smtClean="0"/>
+              <a:rPr lang="en-US"/>
               <a:t>Click to edit Master text styles</a:t>
             </a:r>
           </a:p>
           <a:p>
             <a:pPr lvl="1"/>
             <a:r>
-              <a:rPr lang="en-US" smtClean="0"/>
+              <a:rPr lang="en-US"/>
               <a:t>Second level</a:t>
             </a:r>
           </a:p>
           <a:p>
             <a:pPr lvl="2"/>
             <a:r>
-              <a:rPr lang="en-US" smtClean="0"/>
+              <a:rPr lang="en-US"/>
               <a:t>Third level</a:t>
             </a:r>
           </a:p>
           <a:p>
             <a:pPr lvl="3"/>
             <a:r>
-              <a:rPr lang="en-US" smtClean="0"/>
+              <a:rPr lang="en-US"/>
               <a:t>Fourth level</a:t>
             </a:r>
           </a:p>
           <a:p>
             <a:pPr lvl="4"/>
             <a:r>
-              <a:rPr lang="en-US" smtClean="0"/>
+              <a:rPr lang="en-US"/>
               <a:t>Fifth level</a:t>
             </a:r>
-            <a:endParaRPr lang="en-US"/>
           </a:p>
         </p:txBody>
       </p:sp>
@@ -2232,7 +2230,7 @@
           <a:p>
             <a:pPr lvl="0"/>
             <a:r>
-              <a:rPr lang="en-US" smtClean="0"/>
+              <a:rPr lang="en-US"/>
               <a:t>Click to edit Master text styles</a:t>
             </a:r>
           </a:p>
@@ -2255,7 +2253,7 @@
           <a:p>
             <a:fld id="{9D7AE3E4-2EE4-4D57-9005-1681787E4578}" type="datetimeFigureOut">
               <a:rPr lang="en-US" smtClean="0"/>
-              <a:t>3/9/2016</a:t>
+              <a:t>10/7/2020</a:t>
             </a:fld>
             <a:endParaRPr lang="en-US"/>
           </a:p>
@@ -2358,10 +2356,9 @@
           </a:lstStyle>
           <a:p>
             <a:r>
-              <a:rPr lang="en-US" smtClean="0"/>
+              <a:rPr lang="en-US"/>
               <a:t>Click to edit Master title style</a:t>
             </a:r>
-            <a:endParaRPr lang="en-US"/>
           </a:p>
         </p:txBody>
       </p:sp>
@@ -2485,7 +2482,7 @@
           <a:p>
             <a:pPr lvl="0"/>
             <a:r>
-              <a:rPr lang="en-US" smtClean="0"/>
+              <a:rPr lang="en-US"/>
               <a:t>Click to edit Master text styles</a:t>
             </a:r>
           </a:p>
@@ -2508,7 +2505,7 @@
           <a:p>
             <a:fld id="{9D7AE3E4-2EE4-4D57-9005-1681787E4578}" type="datetimeFigureOut">
               <a:rPr lang="en-US" smtClean="0"/>
-              <a:t>3/9/2016</a:t>
+              <a:t>10/7/2020</a:t>
             </a:fld>
             <a:endParaRPr lang="en-US"/>
           </a:p>
@@ -2617,10 +2614,9 @@
           <a:lstStyle/>
           <a:p>
             <a:r>
-              <a:rPr lang="en-US" smtClean="0"/>
+              <a:rPr lang="en-US"/>
               <a:t>Click to edit Master title style</a:t>
             </a:r>
-            <a:endParaRPr lang="en-US"/>
           </a:p>
         </p:txBody>
       </p:sp>
@@ -2651,38 +2647,37 @@
           <a:p>
             <a:pPr lvl="0"/>
             <a:r>
-              <a:rPr lang="en-US" smtClean="0"/>
+              <a:rPr lang="en-US"/>
               <a:t>Click to edit Master text styles</a:t>
             </a:r>
           </a:p>
           <a:p>
             <a:pPr lvl="1"/>
             <a:r>
-              <a:rPr lang="en-US" smtClean="0"/>
+              <a:rPr lang="en-US"/>
               <a:t>Second level</a:t>
             </a:r>
           </a:p>
           <a:p>
             <a:pPr lvl="2"/>
             <a:r>
-              <a:rPr lang="en-US" smtClean="0"/>
+              <a:rPr lang="en-US"/>
               <a:t>Third level</a:t>
             </a:r>
           </a:p>
           <a:p>
             <a:pPr lvl="3"/>
             <a:r>
-              <a:rPr lang="en-US" smtClean="0"/>
+              <a:rPr lang="en-US"/>
               <a:t>Fourth level</a:t>
             </a:r>
           </a:p>
           <a:p>
             <a:pPr lvl="4"/>
             <a:r>
-              <a:rPr lang="en-US" smtClean="0"/>
+              <a:rPr lang="en-US"/>
               <a:t>Fifth level</a:t>
             </a:r>
-            <a:endParaRPr lang="en-US"/>
           </a:p>
         </p:txBody>
       </p:sp>
@@ -2721,7 +2716,7 @@
           <a:p>
             <a:fld id="{9D7AE3E4-2EE4-4D57-9005-1681787E4578}" type="datetimeFigureOut">
               <a:rPr lang="en-US" smtClean="0"/>
-              <a:t>3/9/2016</a:t>
+              <a:t>10/7/2020</a:t>
             </a:fld>
             <a:endParaRPr lang="en-US"/>
           </a:p>
@@ -3104,8 +3099,8 @@
         </p:nvSpPr>
         <p:spPr>
           <a:xfrm>
-            <a:off x="590550" y="381000"/>
-            <a:ext cx="990600" cy="304800"/>
+            <a:off x="601567" y="0"/>
+            <a:ext cx="990600" cy="292846"/>
           </a:xfrm>
           <a:prstGeom prst="flowChartTerminator">
             <a:avLst/>
@@ -3139,18 +3134,13 @@
           <a:p>
             <a:pPr algn="ctr"/>
             <a:r>
-              <a:rPr lang="en-US" dirty="0" smtClean="0">
+              <a:rPr lang="en-US" dirty="0">
                 <a:solidFill>
                   <a:schemeClr val="tx1"/>
                 </a:solidFill>
               </a:rPr>
               <a:t>Start</a:t>
             </a:r>
-            <a:endParaRPr lang="en-US" dirty="0">
-              <a:solidFill>
-                <a:schemeClr val="tx1"/>
-              </a:solidFill>
-            </a:endParaRPr>
           </a:p>
         </p:txBody>
       </p:sp>
@@ -3162,7 +3152,7 @@
         </p:nvSpPr>
         <p:spPr>
           <a:xfrm>
-            <a:off x="304800" y="6019800"/>
+            <a:off x="304800" y="6562788"/>
             <a:ext cx="990600" cy="304800"/>
           </a:xfrm>
           <a:prstGeom prst="flowChartTerminator">
@@ -3197,18 +3187,13 @@
           <a:p>
             <a:pPr algn="ctr"/>
             <a:r>
-              <a:rPr lang="en-US" dirty="0" smtClean="0">
+              <a:rPr lang="en-US" dirty="0">
                 <a:solidFill>
                   <a:schemeClr val="tx1"/>
                 </a:solidFill>
               </a:rPr>
               <a:t>End</a:t>
             </a:r>
-            <a:endParaRPr lang="en-US" dirty="0">
-              <a:solidFill>
-                <a:schemeClr val="tx1"/>
-              </a:solidFill>
-            </a:endParaRPr>
           </a:p>
         </p:txBody>
       </p:sp>
@@ -3220,7 +3205,7 @@
         </p:nvSpPr>
         <p:spPr>
           <a:xfrm>
-            <a:off x="533400" y="1431600"/>
+            <a:off x="533400" y="1974588"/>
             <a:ext cx="1104900" cy="685800"/>
           </a:xfrm>
           <a:prstGeom prst="flowChartDecision">
@@ -3270,7 +3255,7 @@
         </p:nvSpPr>
         <p:spPr>
           <a:xfrm>
-            <a:off x="1847850" y="1431600"/>
+            <a:off x="1847850" y="1974588"/>
             <a:ext cx="1104900" cy="685800"/>
           </a:xfrm>
           <a:prstGeom prst="flowChartDecision">
@@ -3320,7 +3305,7 @@
         </p:nvSpPr>
         <p:spPr>
           <a:xfrm>
-            <a:off x="3581400" y="1431600"/>
+            <a:off x="3581400" y="1974588"/>
             <a:ext cx="1104900" cy="685800"/>
           </a:xfrm>
           <a:prstGeom prst="flowChartDecision">
@@ -3370,7 +3355,7 @@
         </p:nvSpPr>
         <p:spPr>
           <a:xfrm>
-            <a:off x="6553200" y="1431600"/>
+            <a:off x="6553200" y="1974588"/>
             <a:ext cx="1104900" cy="685800"/>
           </a:xfrm>
           <a:prstGeom prst="flowChartDecision">
@@ -3420,7 +3405,7 @@
         </p:nvSpPr>
         <p:spPr>
           <a:xfrm>
-            <a:off x="3581400" y="3093166"/>
+            <a:off x="3581400" y="3636154"/>
             <a:ext cx="1104900" cy="685800"/>
           </a:xfrm>
           <a:prstGeom prst="flowChartDecision">
@@ -3470,7 +3455,7 @@
         </p:nvSpPr>
         <p:spPr>
           <a:xfrm>
-            <a:off x="1846950" y="3852731"/>
+            <a:off x="1846950" y="4395719"/>
             <a:ext cx="1104900" cy="685800"/>
           </a:xfrm>
           <a:prstGeom prst="flowChartDecision">
@@ -3520,7 +3505,7 @@
         </p:nvSpPr>
         <p:spPr>
           <a:xfrm>
-            <a:off x="5257800" y="3093165"/>
+            <a:off x="5257800" y="3636153"/>
             <a:ext cx="1104900" cy="685800"/>
           </a:xfrm>
           <a:prstGeom prst="flowChartDecision">
@@ -3570,7 +3555,7 @@
         </p:nvSpPr>
         <p:spPr>
           <a:xfrm>
-            <a:off x="7696200" y="2230200"/>
+            <a:off x="7696200" y="2773188"/>
             <a:ext cx="914400" cy="304800"/>
           </a:xfrm>
           <a:prstGeom prst="flowChartProcess">
@@ -3605,18 +3590,13 @@
           <a:p>
             <a:pPr algn="ctr"/>
             <a:r>
-              <a:rPr lang="en-US" sz="1000" dirty="0" smtClean="0">
+              <a:rPr lang="en-US" sz="1000" dirty="0">
                 <a:solidFill>
                   <a:schemeClr val="tx1"/>
                 </a:solidFill>
               </a:rPr>
               <a:t>Engage backup</a:t>
             </a:r>
-            <a:endParaRPr lang="en-US" sz="1000" dirty="0">
-              <a:solidFill>
-                <a:schemeClr val="tx1"/>
-              </a:solidFill>
-            </a:endParaRPr>
           </a:p>
         </p:txBody>
       </p:sp>
@@ -3628,7 +3608,7 @@
         </p:nvSpPr>
         <p:spPr>
           <a:xfrm>
-            <a:off x="7010400" y="4516765"/>
+            <a:off x="6913085" y="5212152"/>
             <a:ext cx="914400" cy="304800"/>
           </a:xfrm>
           <a:prstGeom prst="flowChartProcess">
@@ -3663,7 +3643,7 @@
           <a:p>
             <a:pPr algn="ctr"/>
             <a:r>
-              <a:rPr lang="en-US" sz="1200" dirty="0" smtClean="0">
+              <a:rPr lang="en-US" sz="1200" dirty="0">
                 <a:solidFill>
                   <a:schemeClr val="tx1"/>
                 </a:solidFill>
@@ -3681,7 +3661,7 @@
         </p:nvSpPr>
         <p:spPr>
           <a:xfrm>
-            <a:off x="7010400" y="3855166"/>
+            <a:off x="6913085" y="4692310"/>
             <a:ext cx="914400" cy="304800"/>
           </a:xfrm>
           <a:prstGeom prst="flowChartProcess">
@@ -3716,18 +3696,13 @@
           <a:p>
             <a:pPr algn="ctr"/>
             <a:r>
-              <a:rPr lang="en-US" sz="1000" dirty="0" smtClean="0">
+              <a:rPr lang="en-US" sz="1000" dirty="0">
                 <a:solidFill>
                   <a:schemeClr val="tx1"/>
                 </a:solidFill>
               </a:rPr>
               <a:t>Turn off All sources</a:t>
             </a:r>
-            <a:endParaRPr lang="en-US" sz="1000" dirty="0">
-              <a:solidFill>
-                <a:schemeClr val="tx1"/>
-              </a:solidFill>
-            </a:endParaRPr>
           </a:p>
         </p:txBody>
       </p:sp>
@@ -3739,7 +3714,7 @@
         </p:nvSpPr>
         <p:spPr>
           <a:xfrm>
-            <a:off x="5105400" y="1622100"/>
+            <a:off x="5105400" y="2165088"/>
             <a:ext cx="914400" cy="304800"/>
           </a:xfrm>
           <a:prstGeom prst="flowChartProcess">
@@ -3774,18 +3749,13 @@
           <a:p>
             <a:pPr algn="ctr"/>
             <a:r>
-              <a:rPr lang="en-US" sz="1200" dirty="0" smtClean="0">
+              <a:rPr lang="en-US" sz="1200" dirty="0">
                 <a:solidFill>
                   <a:schemeClr val="tx1"/>
                 </a:solidFill>
               </a:rPr>
               <a:t>disengage</a:t>
             </a:r>
-            <a:endParaRPr lang="en-US" sz="1200" dirty="0">
-              <a:solidFill>
-                <a:schemeClr val="tx1"/>
-              </a:solidFill>
-            </a:endParaRPr>
           </a:p>
         </p:txBody>
       </p:sp>
@@ -3797,8 +3767,8 @@
         </p:nvSpPr>
         <p:spPr>
           <a:xfrm>
-            <a:off x="628650" y="914400"/>
-            <a:ext cx="914400" cy="304800"/>
+            <a:off x="817429" y="1647295"/>
+            <a:ext cx="533400" cy="171315"/>
           </a:xfrm>
           <a:prstGeom prst="flowChartProcess">
             <a:avLst/>
@@ -3832,7 +3802,7 @@
           <a:p>
             <a:pPr algn="ctr"/>
             <a:r>
-              <a:rPr lang="en-US" sz="1200" dirty="0" err="1" smtClean="0">
+              <a:rPr lang="en-US" sz="1200" dirty="0" err="1">
                 <a:solidFill>
                   <a:schemeClr val="tx1"/>
                 </a:solidFill>
@@ -3840,18 +3810,13 @@
               <a:t>i</a:t>
             </a:r>
             <a:r>
-              <a:rPr lang="en-US" sz="1200" dirty="0" smtClean="0">
+              <a:rPr lang="en-US" sz="1200" dirty="0">
                 <a:solidFill>
                   <a:schemeClr val="tx1"/>
                 </a:solidFill>
               </a:rPr>
               <a:t> = 0</a:t>
             </a:r>
-            <a:endParaRPr lang="en-US" sz="1200" dirty="0">
-              <a:solidFill>
-                <a:schemeClr val="tx1"/>
-              </a:solidFill>
-            </a:endParaRPr>
           </a:p>
         </p:txBody>
       </p:sp>
@@ -3863,7 +3828,7 @@
         </p:nvSpPr>
         <p:spPr>
           <a:xfrm>
-            <a:off x="533400" y="1574445"/>
+            <a:off x="533400" y="2117433"/>
             <a:ext cx="1104900" cy="369332"/>
           </a:xfrm>
           <a:prstGeom prst="rect">
@@ -3880,14 +3845,10 @@
             <a:pPr algn="ctr"/>
             <a:r>
               <a:rPr lang="en-US" sz="900" dirty="0"/>
-              <a:t>i</a:t>
-            </a:r>
-            <a:r>
-              <a:rPr lang="en-US" sz="900" dirty="0" smtClean="0"/>
-              <a:t> &lt; number of </a:t>
-            </a:r>
-            <a:r>
-              <a:rPr lang="en-US" sz="900" dirty="0" err="1" smtClean="0">
+              <a:t>i &lt; number of </a:t>
+            </a:r>
+            <a:r>
+              <a:rPr lang="en-US" sz="900" dirty="0" err="1">
                 <a:cs typeface="Arial" panose="020B0604020202020204" pitchFamily="34" charset="0"/>
               </a:rPr>
               <a:t>HeatSources</a:t>
@@ -3906,7 +3867,7 @@
         </p:nvSpPr>
         <p:spPr>
           <a:xfrm>
-            <a:off x="1961250" y="1598145"/>
+            <a:off x="1961250" y="2141133"/>
             <a:ext cx="876300" cy="369332"/>
           </a:xfrm>
           <a:prstGeom prst="rect">
@@ -3922,10 +3883,9 @@
           <a:p>
             <a:pPr algn="ctr"/>
             <a:r>
-              <a:rPr lang="en-US" sz="900" dirty="0" smtClean="0"/>
+              <a:rPr lang="en-US" sz="900" dirty="0"/>
               <a:t>Any Source is heating</a:t>
             </a:r>
-            <a:endParaRPr lang="en-US" sz="900" dirty="0"/>
           </a:p>
         </p:txBody>
       </p:sp>
@@ -3937,7 +3897,7 @@
         </p:nvSpPr>
         <p:spPr>
           <a:xfrm>
-            <a:off x="3714750" y="1505195"/>
+            <a:off x="3714750" y="2048183"/>
             <a:ext cx="838200" cy="507831"/>
           </a:xfrm>
           <a:prstGeom prst="rect">
@@ -3953,19 +3913,19 @@
           <a:p>
             <a:pPr algn="ctr"/>
             <a:r>
-              <a:rPr lang="en-US" sz="900" dirty="0" smtClean="0"/>
+              <a:rPr lang="en-US" sz="900" dirty="0"/>
               <a:t>Source </a:t>
             </a:r>
             <a:r>
-              <a:rPr lang="en-US" sz="900" dirty="0" err="1" smtClean="0"/>
+              <a:rPr lang="en-US" sz="900" dirty="0" err="1"/>
               <a:t>i</a:t>
             </a:r>
             <a:r>
-              <a:rPr lang="en-US" sz="900" dirty="0" smtClean="0"/>
+              <a:rPr lang="en-US" sz="900" dirty="0"/>
               <a:t> is engaged &amp;&amp; </a:t>
             </a:r>
             <a:r>
-              <a:rPr lang="en-US" sz="900" dirty="0" err="1" smtClean="0"/>
+              <a:rPr lang="en-US" sz="900" dirty="0" err="1"/>
               <a:t>shutsOff</a:t>
             </a:r>
             <a:endParaRPr lang="en-US" sz="900" dirty="0"/>
@@ -3980,7 +3940,7 @@
         </p:nvSpPr>
         <p:spPr>
           <a:xfrm>
-            <a:off x="6686550" y="1572907"/>
+            <a:off x="6686550" y="2115895"/>
             <a:ext cx="838200" cy="461665"/>
           </a:xfrm>
           <a:prstGeom prst="rect">
@@ -3996,15 +3956,15 @@
           <a:p>
             <a:pPr algn="ctr"/>
             <a:r>
-              <a:rPr lang="en-US" sz="800" dirty="0" err="1" smtClean="0"/>
+              <a:rPr lang="en-US" sz="800" dirty="0" err="1"/>
               <a:t>hasBackup</a:t>
             </a:r>
             <a:r>
-              <a:rPr lang="en-US" sz="800" dirty="0" smtClean="0"/>
+              <a:rPr lang="en-US" sz="800" dirty="0"/>
               <a:t> &amp;&amp; backup not </a:t>
             </a:r>
             <a:r>
-              <a:rPr lang="en-US" sz="800" dirty="0" err="1" smtClean="0"/>
+              <a:rPr lang="en-US" sz="800" dirty="0" err="1"/>
               <a:t>shutsOff</a:t>
             </a:r>
             <a:endParaRPr lang="en-US" sz="800" dirty="0"/>
@@ -4019,7 +3979,7 @@
         </p:nvSpPr>
         <p:spPr>
           <a:xfrm>
-            <a:off x="3790500" y="3251400"/>
+            <a:off x="3790500" y="3794388"/>
             <a:ext cx="686700" cy="369332"/>
           </a:xfrm>
           <a:prstGeom prst="rect">
@@ -4035,13 +3995,8 @@
           <a:p>
             <a:r>
               <a:rPr lang="en-US" dirty="0"/>
-              <a:t>i</a:t>
-            </a:r>
-            <a:r>
-              <a:rPr lang="en-US" dirty="0" smtClean="0"/>
-              <a:t>s VIP</a:t>
-            </a:r>
-            <a:endParaRPr lang="en-US" dirty="0"/>
+              <a:t>is VIP</a:t>
+            </a:r>
           </a:p>
         </p:txBody>
       </p:sp>
@@ -4053,7 +4008,7 @@
         </p:nvSpPr>
         <p:spPr>
           <a:xfrm>
-            <a:off x="5314950" y="3297565"/>
+            <a:off x="5314950" y="3840553"/>
             <a:ext cx="990600" cy="276999"/>
           </a:xfrm>
           <a:prstGeom prst="rect">
@@ -4069,10 +4024,9 @@
           <a:p>
             <a:pPr algn="ctr"/>
             <a:r>
-              <a:rPr lang="en-US" sz="1200" dirty="0" smtClean="0"/>
+              <a:rPr lang="en-US" sz="1200" dirty="0"/>
               <a:t>Should Heat</a:t>
             </a:r>
-            <a:endParaRPr lang="en-US" sz="1200" dirty="0"/>
           </a:p>
         </p:txBody>
       </p:sp>
@@ -4084,7 +4038,7 @@
         </p:nvSpPr>
         <p:spPr>
           <a:xfrm>
-            <a:off x="1972650" y="3976965"/>
+            <a:off x="1972650" y="4519953"/>
             <a:ext cx="857250" cy="400110"/>
           </a:xfrm>
           <a:prstGeom prst="rect">
@@ -4100,18 +4054,17 @@
           <a:p>
             <a:pPr algn="ctr"/>
             <a:r>
-              <a:rPr lang="en-US" sz="1000" dirty="0" smtClean="0"/>
+              <a:rPr lang="en-US" sz="1000" dirty="0"/>
               <a:t>Source </a:t>
             </a:r>
             <a:r>
-              <a:rPr lang="en-US" sz="1000" dirty="0" err="1" smtClean="0"/>
+              <a:rPr lang="en-US" sz="1000" dirty="0" err="1"/>
               <a:t>i</a:t>
             </a:r>
             <a:r>
-              <a:rPr lang="en-US" sz="1000" dirty="0" smtClean="0"/>
+              <a:rPr lang="en-US" sz="1000" dirty="0"/>
               <a:t> Should Heat</a:t>
             </a:r>
-            <a:endParaRPr lang="en-US" sz="1000" dirty="0"/>
           </a:p>
         </p:txBody>
       </p:sp>
@@ -4123,7 +4076,7 @@
         </p:nvSpPr>
         <p:spPr>
           <a:xfrm>
-            <a:off x="2952750" y="4516764"/>
+            <a:off x="2952750" y="5059752"/>
             <a:ext cx="914400" cy="304800"/>
           </a:xfrm>
           <a:prstGeom prst="flowChartProcess">
@@ -4158,7 +4111,7 @@
           <a:p>
             <a:pPr algn="ctr"/>
             <a:r>
-              <a:rPr lang="en-US" sz="1200" dirty="0" smtClean="0">
+              <a:rPr lang="en-US" sz="1200" dirty="0">
                 <a:solidFill>
                   <a:schemeClr val="tx1"/>
                 </a:solidFill>
@@ -4172,15 +4125,16 @@
         <p:nvCxnSpPr>
           <p:cNvPr id="29" name="Straight Arrow Connector 28"/>
           <p:cNvCxnSpPr>
+            <a:cxnSpLocks/>
             <a:stCxn id="5" idx="2"/>
-            <a:endCxn id="19" idx="0"/>
+            <a:endCxn id="238" idx="0"/>
           </p:cNvCxnSpPr>
           <p:nvPr/>
         </p:nvCxnSpPr>
         <p:spPr>
           <a:xfrm>
-            <a:off x="1085850" y="685800"/>
-            <a:ext cx="0" cy="228600"/>
+            <a:off x="1096867" y="292846"/>
+            <a:ext cx="0" cy="173623"/>
           </a:xfrm>
           <a:prstGeom prst="straightConnector1">
             <a:avLst/>
@@ -4211,6 +4165,7 @@
         <p:nvCxnSpPr>
           <p:cNvPr id="32" name="Straight Arrow Connector 31"/>
           <p:cNvCxnSpPr>
+            <a:cxnSpLocks/>
             <a:stCxn id="19" idx="2"/>
             <a:endCxn id="7" idx="0"/>
           </p:cNvCxnSpPr>
@@ -4218,8 +4173,8 @@
         </p:nvCxnSpPr>
         <p:spPr>
           <a:xfrm>
-            <a:off x="1085850" y="1219200"/>
-            <a:ext cx="0" cy="212400"/>
+            <a:off x="1084129" y="1818610"/>
+            <a:ext cx="1721" cy="155978"/>
           </a:xfrm>
           <a:prstGeom prst="straightConnector1">
             <a:avLst/>
@@ -4257,7 +4212,7 @@
         </p:nvCxnSpPr>
         <p:spPr>
           <a:xfrm>
-            <a:off x="1638300" y="1774500"/>
+            <a:off x="1638300" y="2317488"/>
             <a:ext cx="209550" cy="0"/>
           </a:xfrm>
           <a:prstGeom prst="straightConnector1">
@@ -4296,7 +4251,7 @@
         </p:nvCxnSpPr>
         <p:spPr>
           <a:xfrm>
-            <a:off x="2952750" y="1774500"/>
+            <a:off x="2952750" y="2317488"/>
             <a:ext cx="628650" cy="0"/>
           </a:xfrm>
           <a:prstGeom prst="straightConnector1">
@@ -4335,7 +4290,7 @@
         </p:nvCxnSpPr>
         <p:spPr>
           <a:xfrm>
-            <a:off x="4686300" y="1774500"/>
+            <a:off x="4686300" y="2317488"/>
             <a:ext cx="419100" cy="0"/>
           </a:xfrm>
           <a:prstGeom prst="straightConnector1">
@@ -4374,7 +4329,7 @@
         </p:nvCxnSpPr>
         <p:spPr>
           <a:xfrm>
-            <a:off x="6019800" y="1774500"/>
+            <a:off x="6019800" y="2317488"/>
             <a:ext cx="533400" cy="0"/>
           </a:xfrm>
           <a:prstGeom prst="straightConnector1">
@@ -4413,7 +4368,7 @@
         </p:nvCxnSpPr>
         <p:spPr>
           <a:xfrm flipH="1">
-            <a:off x="2399400" y="2117400"/>
+            <a:off x="2399400" y="2660388"/>
             <a:ext cx="900" cy="1735331"/>
           </a:xfrm>
           <a:prstGeom prst="straightConnector1">
@@ -4452,7 +4407,7 @@
         </p:nvCxnSpPr>
         <p:spPr>
           <a:xfrm>
-            <a:off x="7658100" y="1774500"/>
+            <a:off x="7658100" y="2317488"/>
             <a:ext cx="495300" cy="455700"/>
           </a:xfrm>
           <a:prstGeom prst="bentConnector2">
@@ -4491,7 +4446,7 @@
         </p:nvCxnSpPr>
         <p:spPr>
           <a:xfrm rot="5400000">
-            <a:off x="5864542" y="804308"/>
+            <a:off x="5864542" y="1347296"/>
             <a:ext cx="558166" cy="4019550"/>
           </a:xfrm>
           <a:prstGeom prst="bentConnector3">
@@ -4531,7 +4486,7 @@
         </p:nvCxnSpPr>
         <p:spPr>
           <a:xfrm>
-            <a:off x="4133850" y="2117400"/>
+            <a:off x="4133850" y="2660388"/>
             <a:ext cx="0" cy="772883"/>
           </a:xfrm>
           <a:prstGeom prst="straightConnector1">
@@ -4569,7 +4524,7 @@
         </p:nvCxnSpPr>
         <p:spPr>
           <a:xfrm>
-            <a:off x="7105650" y="2117400"/>
+            <a:off x="7105650" y="2660388"/>
             <a:ext cx="6300" cy="772883"/>
           </a:xfrm>
           <a:prstGeom prst="straightConnector1">
@@ -4608,7 +4563,7 @@
         </p:nvCxnSpPr>
         <p:spPr>
           <a:xfrm flipV="1">
-            <a:off x="4686300" y="3436065"/>
+            <a:off x="4686300" y="3979053"/>
             <a:ext cx="628650" cy="1"/>
           </a:xfrm>
           <a:prstGeom prst="straightConnector1">
@@ -4640,18 +4595,21 @@
         <p:nvCxnSpPr>
           <p:cNvPr id="109" name="Elbow Connector 108"/>
           <p:cNvCxnSpPr>
+            <a:cxnSpLocks/>
             <a:stCxn id="13" idx="3"/>
-            <a:endCxn id="16" idx="0"/>
+            <a:endCxn id="80" idx="1"/>
           </p:cNvCxnSpPr>
           <p:nvPr/>
         </p:nvCxnSpPr>
         <p:spPr>
-          <a:xfrm>
-            <a:off x="6362700" y="3436065"/>
-            <a:ext cx="1104900" cy="419101"/>
-          </a:xfrm>
-          <a:prstGeom prst="bentConnector2">
-            <a:avLst/>
+          <a:xfrm flipV="1">
+            <a:off x="6362700" y="3977104"/>
+            <a:ext cx="449740" cy="1949"/>
+          </a:xfrm>
+          <a:prstGeom prst="bentConnector3">
+            <a:avLst>
+              <a:gd name="adj1" fmla="val 50000"/>
+            </a:avLst>
           </a:prstGeom>
           <a:ln w="22225">
             <a:solidFill>
@@ -4686,8 +4644,8 @@
         </p:nvCxnSpPr>
         <p:spPr>
           <a:xfrm>
-            <a:off x="7467600" y="4159966"/>
-            <a:ext cx="0" cy="356799"/>
+            <a:off x="7370285" y="4997110"/>
+            <a:ext cx="0" cy="215042"/>
           </a:xfrm>
           <a:prstGeom prst="straightConnector1">
             <a:avLst/>
@@ -4724,7 +4682,7 @@
         </p:nvCxnSpPr>
         <p:spPr>
           <a:xfrm rot="10800000" flipV="1">
-            <a:off x="304800" y="1774500"/>
+            <a:off x="304800" y="2317488"/>
             <a:ext cx="228600" cy="4016702"/>
           </a:xfrm>
           <a:prstGeom prst="bentConnector2">
@@ -4756,17 +4714,19 @@
         <p:nvCxnSpPr>
           <p:cNvPr id="120" name="Elbow Connector 119"/>
           <p:cNvCxnSpPr>
-            <a:stCxn id="15" idx="2"/>
+            <a:cxnSpLocks/>
           </p:cNvCxnSpPr>
           <p:nvPr/>
         </p:nvCxnSpPr>
         <p:spPr>
-          <a:xfrm rot="5400000">
-            <a:off x="3649032" y="1972633"/>
-            <a:ext cx="969637" cy="6667500"/>
-          </a:xfrm>
-          <a:prstGeom prst="bentConnector2">
-            <a:avLst/>
+          <a:xfrm rot="10800000" flipV="1">
+            <a:off x="817430" y="5516954"/>
+            <a:ext cx="6552857" cy="803338"/>
+          </a:xfrm>
+          <a:prstGeom prst="bentConnector3">
+            <a:avLst>
+              <a:gd name="adj1" fmla="val -235"/>
+            </a:avLst>
           </a:prstGeom>
           <a:ln w="22225">
             <a:solidFill>
@@ -4800,7 +4760,7 @@
         </p:nvCxnSpPr>
         <p:spPr>
           <a:xfrm>
-            <a:off x="800100" y="5791202"/>
+            <a:off x="800100" y="6334190"/>
             <a:ext cx="0" cy="228598"/>
           </a:xfrm>
           <a:prstGeom prst="straightConnector1">
@@ -4836,7 +4796,7 @@
         </p:nvCxnSpPr>
         <p:spPr>
           <a:xfrm>
-            <a:off x="304800" y="5791202"/>
+            <a:off x="304800" y="6334190"/>
             <a:ext cx="495300" cy="0"/>
           </a:xfrm>
           <a:prstGeom prst="straightConnector1">
@@ -4874,7 +4834,7 @@
         </p:nvCxnSpPr>
         <p:spPr>
           <a:xfrm flipV="1">
-            <a:off x="1085850" y="3588464"/>
+            <a:off x="1085850" y="4131452"/>
             <a:ext cx="0" cy="1791267"/>
           </a:xfrm>
           <a:prstGeom prst="straightConnector1">
@@ -4912,7 +4872,7 @@
         </p:nvCxnSpPr>
         <p:spPr>
           <a:xfrm>
-            <a:off x="2399400" y="4538531"/>
+            <a:off x="2399400" y="5081519"/>
             <a:ext cx="1875" cy="841199"/>
           </a:xfrm>
           <a:prstGeom prst="straightConnector1">
@@ -4951,7 +4911,7 @@
         </p:nvCxnSpPr>
         <p:spPr>
           <a:xfrm>
-            <a:off x="2951850" y="4195631"/>
+            <a:off x="2951850" y="4738619"/>
             <a:ext cx="458100" cy="321133"/>
           </a:xfrm>
           <a:prstGeom prst="bentConnector2">
@@ -4989,7 +4949,7 @@
         </p:nvCxnSpPr>
         <p:spPr>
           <a:xfrm>
-            <a:off x="4133850" y="3778966"/>
+            <a:off x="4133850" y="4321954"/>
             <a:ext cx="1" cy="1600764"/>
           </a:xfrm>
           <a:prstGeom prst="straightConnector1">
@@ -5025,7 +4985,7 @@
         </p:nvCxnSpPr>
         <p:spPr>
           <a:xfrm flipH="1">
-            <a:off x="1085852" y="5379730"/>
+            <a:off x="1085852" y="5922718"/>
             <a:ext cx="4724398" cy="0"/>
           </a:xfrm>
           <a:prstGeom prst="straightConnector1">
@@ -5063,7 +5023,7 @@
         </p:nvCxnSpPr>
         <p:spPr>
           <a:xfrm>
-            <a:off x="3409950" y="4821564"/>
+            <a:off x="3409950" y="5364552"/>
             <a:ext cx="0" cy="558166"/>
           </a:xfrm>
           <a:prstGeom prst="straightConnector1">
@@ -5101,7 +5061,7 @@
         </p:nvCxnSpPr>
         <p:spPr>
           <a:xfrm>
-            <a:off x="5810250" y="3778965"/>
+            <a:off x="5810250" y="4321953"/>
             <a:ext cx="0" cy="1600765"/>
           </a:xfrm>
           <a:prstGeom prst="straightConnector1">
@@ -5137,7 +5097,7 @@
         </p:nvSpPr>
         <p:spPr>
           <a:xfrm>
-            <a:off x="1518900" y="1471200"/>
+            <a:off x="1518900" y="2014188"/>
             <a:ext cx="533399" cy="276999"/>
           </a:xfrm>
           <a:prstGeom prst="rect">
@@ -5152,7 +5112,7 @@
           <a:lstStyle/>
           <a:p>
             <a:r>
-              <a:rPr lang="en-US" sz="1200" dirty="0" smtClean="0"/>
+              <a:rPr lang="en-US" sz="1200" dirty="0"/>
               <a:t>True</a:t>
             </a:r>
           </a:p>
@@ -5166,7 +5126,7 @@
         </p:nvSpPr>
         <p:spPr>
           <a:xfrm>
-            <a:off x="142875" y="1489309"/>
+            <a:off x="252412" y="2352611"/>
             <a:ext cx="552450" cy="276999"/>
           </a:xfrm>
           <a:prstGeom prst="rect">
@@ -5181,7 +5141,7 @@
           <a:lstStyle/>
           <a:p>
             <a:r>
-              <a:rPr lang="en-US" sz="1200" dirty="0" smtClean="0"/>
+              <a:rPr lang="en-US" sz="1200" dirty="0"/>
               <a:t>False</a:t>
             </a:r>
           </a:p>
@@ -5195,7 +5155,7 @@
         </p:nvSpPr>
         <p:spPr>
           <a:xfrm>
-            <a:off x="2951850" y="1496310"/>
+            <a:off x="2951850" y="2039298"/>
             <a:ext cx="533399" cy="276999"/>
           </a:xfrm>
           <a:prstGeom prst="rect">
@@ -5210,7 +5170,7 @@
           <a:lstStyle/>
           <a:p>
             <a:r>
-              <a:rPr lang="en-US" sz="1200" dirty="0" smtClean="0"/>
+              <a:rPr lang="en-US" sz="1200" dirty="0"/>
               <a:t>True</a:t>
             </a:r>
           </a:p>
@@ -5224,7 +5184,7 @@
         </p:nvSpPr>
         <p:spPr>
           <a:xfrm>
-            <a:off x="4629150" y="1496109"/>
+            <a:off x="4629150" y="2039097"/>
             <a:ext cx="533399" cy="276999"/>
           </a:xfrm>
           <a:prstGeom prst="rect">
@@ -5239,7 +5199,7 @@
           <a:lstStyle/>
           <a:p>
             <a:r>
-              <a:rPr lang="en-US" sz="1200" dirty="0" smtClean="0"/>
+              <a:rPr lang="en-US" sz="1200" dirty="0"/>
               <a:t>True</a:t>
             </a:r>
           </a:p>
@@ -5253,7 +5213,7 @@
         </p:nvSpPr>
         <p:spPr>
           <a:xfrm>
-            <a:off x="7616400" y="1526740"/>
+            <a:off x="7616400" y="2069728"/>
             <a:ext cx="533399" cy="276999"/>
           </a:xfrm>
           <a:prstGeom prst="rect">
@@ -5268,7 +5228,7 @@
           <a:lstStyle/>
           <a:p>
             <a:r>
-              <a:rPr lang="en-US" sz="1200" dirty="0" smtClean="0"/>
+              <a:rPr lang="en-US" sz="1200" dirty="0"/>
               <a:t>True</a:t>
             </a:r>
           </a:p>
@@ -5282,7 +5242,7 @@
         </p:nvSpPr>
         <p:spPr>
           <a:xfrm>
-            <a:off x="4663350" y="3188043"/>
+            <a:off x="4663350" y="3731031"/>
             <a:ext cx="533399" cy="276999"/>
           </a:xfrm>
           <a:prstGeom prst="rect">
@@ -5297,7 +5257,7 @@
           <a:lstStyle/>
           <a:p>
             <a:r>
-              <a:rPr lang="en-US" sz="1200" dirty="0" smtClean="0"/>
+              <a:rPr lang="en-US" sz="1200" dirty="0"/>
               <a:t>True</a:t>
             </a:r>
           </a:p>
@@ -5311,8 +5271,8 @@
         </p:nvSpPr>
         <p:spPr>
           <a:xfrm>
-            <a:off x="6341100" y="3188042"/>
-            <a:ext cx="533399" cy="276999"/>
+            <a:off x="6221375" y="3723393"/>
+            <a:ext cx="465176" cy="280709"/>
           </a:xfrm>
           <a:prstGeom prst="rect">
             <a:avLst/>
@@ -5326,7 +5286,7 @@
           <a:lstStyle/>
           <a:p>
             <a:r>
-              <a:rPr lang="en-US" sz="1200" dirty="0" smtClean="0"/>
+              <a:rPr lang="en-US" sz="1200" dirty="0"/>
               <a:t>True</a:t>
             </a:r>
           </a:p>
@@ -5340,7 +5300,7 @@
         </p:nvSpPr>
         <p:spPr>
           <a:xfrm>
-            <a:off x="2900551" y="3953396"/>
+            <a:off x="2900551" y="4496384"/>
             <a:ext cx="533399" cy="276999"/>
           </a:xfrm>
           <a:prstGeom prst="rect">
@@ -5355,7 +5315,7 @@
           <a:lstStyle/>
           <a:p>
             <a:r>
-              <a:rPr lang="en-US" sz="1200" dirty="0" smtClean="0"/>
+              <a:rPr lang="en-US" sz="1200" dirty="0"/>
               <a:t>True</a:t>
             </a:r>
           </a:p>
@@ -5369,7 +5329,7 @@
         </p:nvSpPr>
         <p:spPr>
           <a:xfrm>
-            <a:off x="1923750" y="2117400"/>
+            <a:off x="1923750" y="2660388"/>
             <a:ext cx="552450" cy="276999"/>
           </a:xfrm>
           <a:prstGeom prst="rect">
@@ -5384,7 +5344,7 @@
           <a:lstStyle/>
           <a:p>
             <a:r>
-              <a:rPr lang="en-US" sz="1200" dirty="0" smtClean="0"/>
+              <a:rPr lang="en-US" sz="1200" dirty="0"/>
               <a:t>False</a:t>
             </a:r>
           </a:p>
@@ -5398,7 +5358,7 @@
         </p:nvSpPr>
         <p:spPr>
           <a:xfrm>
-            <a:off x="3656550" y="2117400"/>
+            <a:off x="3656550" y="2660388"/>
             <a:ext cx="552450" cy="276999"/>
           </a:xfrm>
           <a:prstGeom prst="rect">
@@ -5413,7 +5373,7 @@
           <a:lstStyle/>
           <a:p>
             <a:r>
-              <a:rPr lang="en-US" sz="1200" dirty="0" smtClean="0"/>
+              <a:rPr lang="en-US" sz="1200" dirty="0"/>
               <a:t>False</a:t>
             </a:r>
           </a:p>
@@ -5427,7 +5387,7 @@
         </p:nvSpPr>
         <p:spPr>
           <a:xfrm>
-            <a:off x="6643199" y="2117400"/>
+            <a:off x="6643199" y="2660388"/>
             <a:ext cx="552450" cy="276999"/>
           </a:xfrm>
           <a:prstGeom prst="rect">
@@ -5442,7 +5402,7 @@
           <a:lstStyle/>
           <a:p>
             <a:r>
-              <a:rPr lang="en-US" sz="1200" dirty="0" smtClean="0"/>
+              <a:rPr lang="en-US" sz="1200" dirty="0"/>
               <a:t>False</a:t>
             </a:r>
           </a:p>
@@ -5456,7 +5416,7 @@
         </p:nvSpPr>
         <p:spPr>
           <a:xfrm>
-            <a:off x="3698849" y="3778965"/>
+            <a:off x="3698849" y="4321953"/>
             <a:ext cx="552450" cy="276999"/>
           </a:xfrm>
           <a:prstGeom prst="rect">
@@ -5471,7 +5431,7 @@
           <a:lstStyle/>
           <a:p>
             <a:r>
-              <a:rPr lang="en-US" sz="1200" dirty="0" smtClean="0"/>
+              <a:rPr lang="en-US" sz="1200" dirty="0"/>
               <a:t>False</a:t>
             </a:r>
           </a:p>
@@ -5485,7 +5445,7 @@
         </p:nvSpPr>
         <p:spPr>
           <a:xfrm>
-            <a:off x="5370000" y="3782851"/>
+            <a:off x="5370000" y="4325839"/>
             <a:ext cx="552450" cy="276999"/>
           </a:xfrm>
           <a:prstGeom prst="rect">
@@ -5500,7 +5460,7 @@
           <a:lstStyle/>
           <a:p>
             <a:r>
-              <a:rPr lang="en-US" sz="1200" dirty="0" smtClean="0"/>
+              <a:rPr lang="en-US" sz="1200" dirty="0"/>
               <a:t>False</a:t>
             </a:r>
           </a:p>
@@ -5514,7 +5474,7 @@
         </p:nvSpPr>
         <p:spPr>
           <a:xfrm>
-            <a:off x="1930800" y="4536397"/>
+            <a:off x="1930800" y="5079385"/>
             <a:ext cx="552450" cy="276999"/>
           </a:xfrm>
           <a:prstGeom prst="rect">
@@ -5529,7 +5489,7 @@
           <a:lstStyle/>
           <a:p>
             <a:r>
-              <a:rPr lang="en-US" sz="1200" dirty="0" smtClean="0"/>
+              <a:rPr lang="en-US" sz="1200" dirty="0"/>
               <a:t>False</a:t>
             </a:r>
           </a:p>
@@ -5543,7 +5503,7 @@
         </p:nvSpPr>
         <p:spPr>
           <a:xfrm>
-            <a:off x="628650" y="3283664"/>
+            <a:off x="628650" y="3826652"/>
             <a:ext cx="914400" cy="304800"/>
           </a:xfrm>
           <a:prstGeom prst="flowChartProcess">
@@ -5578,7 +5538,7 @@
           <a:p>
             <a:pPr algn="ctr"/>
             <a:r>
-              <a:rPr lang="en-US" sz="1200" dirty="0" err="1" smtClean="0">
+              <a:rPr lang="en-US" sz="1200" dirty="0" err="1">
                 <a:solidFill>
                   <a:schemeClr val="tx1"/>
                 </a:solidFill>
@@ -5586,18 +5546,13 @@
               <a:t>i</a:t>
             </a:r>
             <a:r>
-              <a:rPr lang="en-US" sz="1200" dirty="0" smtClean="0">
+              <a:rPr lang="en-US" sz="1200" dirty="0">
                 <a:solidFill>
                   <a:schemeClr val="tx1"/>
                 </a:solidFill>
               </a:rPr>
               <a:t> + 1</a:t>
             </a:r>
-            <a:endParaRPr lang="en-US" sz="1200" dirty="0">
-              <a:solidFill>
-                <a:schemeClr val="tx1"/>
-              </a:solidFill>
-            </a:endParaRPr>
           </a:p>
         </p:txBody>
       </p:sp>
@@ -5612,7 +5567,7 @@
         </p:nvCxnSpPr>
         <p:spPr>
           <a:xfrm flipV="1">
-            <a:off x="1085850" y="2117400"/>
+            <a:off x="1085850" y="2660388"/>
             <a:ext cx="0" cy="1166264"/>
           </a:xfrm>
           <a:prstGeom prst="straightConnector1">
@@ -5648,7 +5603,7 @@
         </p:nvSpPr>
         <p:spPr>
           <a:xfrm>
-            <a:off x="2801625" y="348734"/>
+            <a:off x="3625565" y="115307"/>
             <a:ext cx="3655049" cy="369332"/>
           </a:xfrm>
           <a:prstGeom prst="rect">
@@ -5663,13 +5618,1113 @@
           <a:lstStyle/>
           <a:p>
             <a:r>
-              <a:rPr lang="en-US" dirty="0" smtClean="0"/>
+              <a:rPr lang="en-US" dirty="0"/>
               <a:t>Heat Source Choice</a:t>
             </a:r>
-            <a:endParaRPr lang="en-US" dirty="0"/>
-          </a:p>
-        </p:txBody>
-      </p:sp>
+          </a:p>
+        </p:txBody>
+      </p:sp>
+      <p:sp>
+        <p:nvSpPr>
+          <p:cNvPr id="28" name="Flowchart: Process 27">
+            <a:extLst>
+              <a:ext uri="{FF2B5EF4-FFF2-40B4-BE49-F238E27FC236}">
+                <a16:creationId xmlns:a16="http://schemas.microsoft.com/office/drawing/2014/main" id="{CB4F4A33-FCB8-4736-820D-4252BB315D8C}"/>
+              </a:ext>
+            </a:extLst>
+          </p:cNvPr>
+          <p:cNvSpPr/>
+          <p:nvPr/>
+        </p:nvSpPr>
+        <p:spPr>
+          <a:xfrm>
+            <a:off x="1827391" y="503023"/>
+            <a:ext cx="1473588" cy="356157"/>
+          </a:xfrm>
+          <a:prstGeom prst="flowChartProcess">
+            <a:avLst/>
+          </a:prstGeom>
+          <a:noFill/>
+          <a:ln>
+            <a:solidFill>
+              <a:schemeClr val="tx1"/>
+            </a:solidFill>
+          </a:ln>
+        </p:spPr>
+        <p:style>
+          <a:lnRef idx="2">
+            <a:schemeClr val="accent1">
+              <a:shade val="50000"/>
+            </a:schemeClr>
+          </a:lnRef>
+          <a:fillRef idx="1">
+            <a:schemeClr val="accent1"/>
+          </a:fillRef>
+          <a:effectRef idx="0">
+            <a:schemeClr val="accent1"/>
+          </a:effectRef>
+          <a:fontRef idx="minor">
+            <a:schemeClr val="lt1"/>
+          </a:fontRef>
+        </p:style>
+        <p:txBody>
+          <a:bodyPr rtlCol="0" anchor="ctr"/>
+          <a:lstStyle/>
+          <a:p>
+            <a:pPr algn="ctr"/>
+            <a:r>
+              <a:rPr lang="en-US" sz="1200" dirty="0">
+                <a:solidFill>
+                  <a:schemeClr val="tx1"/>
+                </a:solidFill>
+              </a:rPr>
+              <a:t>If DR_TOO engage comp and RE</a:t>
+            </a:r>
+          </a:p>
+        </p:txBody>
+      </p:sp>
+      <p:grpSp>
+        <p:nvGrpSpPr>
+          <p:cNvPr id="241" name="Group 240">
+            <a:extLst>
+              <a:ext uri="{FF2B5EF4-FFF2-40B4-BE49-F238E27FC236}">
+                <a16:creationId xmlns:a16="http://schemas.microsoft.com/office/drawing/2014/main" id="{010AF29D-A6C8-4361-9EB2-78A15F54FDDB}"/>
+              </a:ext>
+            </a:extLst>
+          </p:cNvPr>
+          <p:cNvGrpSpPr/>
+          <p:nvPr/>
+        </p:nvGrpSpPr>
+        <p:grpSpPr>
+          <a:xfrm>
+            <a:off x="550155" y="466469"/>
+            <a:ext cx="1104900" cy="438295"/>
+            <a:chOff x="539138" y="466469"/>
+            <a:chExt cx="1104900" cy="438295"/>
+          </a:xfrm>
+        </p:grpSpPr>
+        <p:sp>
+          <p:nvSpPr>
+            <p:cNvPr id="238" name="Flowchart: Decision 237">
+              <a:extLst>
+                <a:ext uri="{FF2B5EF4-FFF2-40B4-BE49-F238E27FC236}">
+                  <a16:creationId xmlns:a16="http://schemas.microsoft.com/office/drawing/2014/main" id="{5DF83795-8AA8-436D-8246-7796179C139D}"/>
+                </a:ext>
+              </a:extLst>
+            </p:cNvPr>
+            <p:cNvSpPr/>
+            <p:nvPr/>
+          </p:nvSpPr>
+          <p:spPr>
+            <a:xfrm>
+              <a:off x="752475" y="466469"/>
+              <a:ext cx="666750" cy="438295"/>
+            </a:xfrm>
+            <a:prstGeom prst="flowChartDecision">
+              <a:avLst/>
+            </a:prstGeom>
+            <a:noFill/>
+            <a:ln>
+              <a:solidFill>
+                <a:schemeClr val="tx1"/>
+              </a:solidFill>
+            </a:ln>
+          </p:spPr>
+          <p:style>
+            <a:lnRef idx="2">
+              <a:schemeClr val="accent1">
+                <a:shade val="50000"/>
+              </a:schemeClr>
+            </a:lnRef>
+            <a:fillRef idx="1">
+              <a:schemeClr val="accent1"/>
+            </a:fillRef>
+            <a:effectRef idx="0">
+              <a:schemeClr val="accent1"/>
+            </a:effectRef>
+            <a:fontRef idx="minor">
+              <a:schemeClr val="lt1"/>
+            </a:fontRef>
+          </p:style>
+          <p:txBody>
+            <a:bodyPr rtlCol="0" anchor="ctr"/>
+            <a:lstStyle/>
+            <a:p>
+              <a:pPr algn="ctr"/>
+              <a:endParaRPr lang="en-US">
+                <a:solidFill>
+                  <a:schemeClr val="tx1"/>
+                </a:solidFill>
+              </a:endParaRPr>
+            </a:p>
+          </p:txBody>
+        </p:sp>
+        <p:sp>
+          <p:nvSpPr>
+            <p:cNvPr id="240" name="TextBox 239">
+              <a:extLst>
+                <a:ext uri="{FF2B5EF4-FFF2-40B4-BE49-F238E27FC236}">
+                  <a16:creationId xmlns:a16="http://schemas.microsoft.com/office/drawing/2014/main" id="{4FD2CBA1-FA59-4B14-B275-6EF4B16DC527}"/>
+                </a:ext>
+              </a:extLst>
+            </p:cNvPr>
+            <p:cNvSpPr txBox="1"/>
+            <p:nvPr/>
+          </p:nvSpPr>
+          <p:spPr>
+            <a:xfrm>
+              <a:off x="539138" y="571899"/>
+              <a:ext cx="1104900" cy="230832"/>
+            </a:xfrm>
+            <a:prstGeom prst="rect">
+              <a:avLst/>
+            </a:prstGeom>
+            <a:noFill/>
+          </p:spPr>
+          <p:txBody>
+            <a:bodyPr wrap="square" rtlCol="0">
+              <a:spAutoFit/>
+            </a:bodyPr>
+            <a:lstStyle/>
+            <a:p>
+              <a:pPr algn="ctr"/>
+              <a:r>
+                <a:rPr lang="en-US" sz="900" dirty="0">
+                  <a:cs typeface="Arial" panose="020B0604020202020204" pitchFamily="34" charset="0"/>
+                </a:rPr>
+                <a:t>If DR_TOO</a:t>
+              </a:r>
+            </a:p>
+          </p:txBody>
+        </p:sp>
+      </p:grpSp>
+      <p:cxnSp>
+        <p:nvCxnSpPr>
+          <p:cNvPr id="90" name="Straight Arrow Connector 89">
+            <a:extLst>
+              <a:ext uri="{FF2B5EF4-FFF2-40B4-BE49-F238E27FC236}">
+                <a16:creationId xmlns:a16="http://schemas.microsoft.com/office/drawing/2014/main" id="{99BA6372-211A-4276-BEA6-59B3415BC873}"/>
+              </a:ext>
+            </a:extLst>
+          </p:cNvPr>
+          <p:cNvCxnSpPr>
+            <a:cxnSpLocks/>
+            <a:stCxn id="238" idx="2"/>
+            <a:endCxn id="114" idx="0"/>
+          </p:cNvCxnSpPr>
+          <p:nvPr/>
+        </p:nvCxnSpPr>
+        <p:spPr>
+          <a:xfrm>
+            <a:off x="1096867" y="904764"/>
+            <a:ext cx="0" cy="141527"/>
+          </a:xfrm>
+          <a:prstGeom prst="straightConnector1">
+            <a:avLst/>
+          </a:prstGeom>
+          <a:ln w="22225">
+            <a:solidFill>
+              <a:schemeClr val="tx1"/>
+            </a:solidFill>
+            <a:tailEnd type="arrow"/>
+          </a:ln>
+        </p:spPr>
+        <p:style>
+          <a:lnRef idx="1">
+            <a:schemeClr val="accent1"/>
+          </a:lnRef>
+          <a:fillRef idx="0">
+            <a:schemeClr val="accent1"/>
+          </a:fillRef>
+          <a:effectRef idx="0">
+            <a:schemeClr val="accent1"/>
+          </a:effectRef>
+          <a:fontRef idx="minor">
+            <a:schemeClr val="tx1"/>
+          </a:fontRef>
+        </p:style>
+      </p:cxnSp>
+      <p:sp>
+        <p:nvSpPr>
+          <p:cNvPr id="247" name="TextBox 246">
+            <a:extLst>
+              <a:ext uri="{FF2B5EF4-FFF2-40B4-BE49-F238E27FC236}">
+                <a16:creationId xmlns:a16="http://schemas.microsoft.com/office/drawing/2014/main" id="{A7477ECF-5331-445D-99DE-FE7DA54ED12C}"/>
+              </a:ext>
+            </a:extLst>
+          </p:cNvPr>
+          <p:cNvSpPr txBox="1"/>
+          <p:nvPr/>
+        </p:nvSpPr>
+        <p:spPr>
+          <a:xfrm>
+            <a:off x="1074604" y="814957"/>
+            <a:ext cx="552450" cy="276999"/>
+          </a:xfrm>
+          <a:prstGeom prst="rect">
+            <a:avLst/>
+          </a:prstGeom>
+          <a:noFill/>
+        </p:spPr>
+        <p:txBody>
+          <a:bodyPr wrap="square" rtlCol="0">
+            <a:spAutoFit/>
+          </a:bodyPr>
+          <a:lstStyle/>
+          <a:p>
+            <a:r>
+              <a:rPr lang="en-US" sz="1200" dirty="0"/>
+              <a:t>False</a:t>
+            </a:r>
+          </a:p>
+        </p:txBody>
+      </p:sp>
+      <p:cxnSp>
+        <p:nvCxnSpPr>
+          <p:cNvPr id="97" name="Elbow Connector 61">
+            <a:extLst>
+              <a:ext uri="{FF2B5EF4-FFF2-40B4-BE49-F238E27FC236}">
+                <a16:creationId xmlns:a16="http://schemas.microsoft.com/office/drawing/2014/main" id="{940188D3-792D-4291-A952-F7FEB311449A}"/>
+              </a:ext>
+            </a:extLst>
+          </p:cNvPr>
+          <p:cNvCxnSpPr>
+            <a:cxnSpLocks/>
+            <a:stCxn id="28" idx="2"/>
+            <a:endCxn id="114" idx="3"/>
+          </p:cNvCxnSpPr>
+          <p:nvPr/>
+        </p:nvCxnSpPr>
+        <p:spPr>
+          <a:xfrm rot="5400000">
+            <a:off x="1794085" y="495338"/>
+            <a:ext cx="406259" cy="1133943"/>
+          </a:xfrm>
+          <a:prstGeom prst="bentConnector2">
+            <a:avLst/>
+          </a:prstGeom>
+          <a:ln w="22225">
+            <a:solidFill>
+              <a:schemeClr val="tx1"/>
+            </a:solidFill>
+            <a:tailEnd type="arrow"/>
+          </a:ln>
+        </p:spPr>
+        <p:style>
+          <a:lnRef idx="1">
+            <a:schemeClr val="accent1"/>
+          </a:lnRef>
+          <a:fillRef idx="0">
+            <a:schemeClr val="accent1"/>
+          </a:fillRef>
+          <a:effectRef idx="0">
+            <a:schemeClr val="accent1"/>
+          </a:effectRef>
+          <a:fontRef idx="minor">
+            <a:schemeClr val="tx1"/>
+          </a:fontRef>
+        </p:style>
+      </p:cxnSp>
+      <p:sp>
+        <p:nvSpPr>
+          <p:cNvPr id="250" name="TextBox 249">
+            <a:extLst>
+              <a:ext uri="{FF2B5EF4-FFF2-40B4-BE49-F238E27FC236}">
+                <a16:creationId xmlns:a16="http://schemas.microsoft.com/office/drawing/2014/main" id="{4A881A90-9F33-474E-9380-330AF0F6F8FF}"/>
+              </a:ext>
+            </a:extLst>
+          </p:cNvPr>
+          <p:cNvSpPr txBox="1"/>
+          <p:nvPr/>
+        </p:nvSpPr>
+        <p:spPr>
+          <a:xfrm>
+            <a:off x="1323976" y="423882"/>
+            <a:ext cx="533399" cy="276999"/>
+          </a:xfrm>
+          <a:prstGeom prst="rect">
+            <a:avLst/>
+          </a:prstGeom>
+          <a:noFill/>
+        </p:spPr>
+        <p:txBody>
+          <a:bodyPr wrap="square" rtlCol="0">
+            <a:spAutoFit/>
+          </a:bodyPr>
+          <a:lstStyle/>
+          <a:p>
+            <a:r>
+              <a:rPr lang="en-US" sz="1200" dirty="0"/>
+              <a:t>True</a:t>
+            </a:r>
+          </a:p>
+        </p:txBody>
+      </p:sp>
+      <p:cxnSp>
+        <p:nvCxnSpPr>
+          <p:cNvPr id="102" name="Straight Arrow Connector 101">
+            <a:extLst>
+              <a:ext uri="{FF2B5EF4-FFF2-40B4-BE49-F238E27FC236}">
+                <a16:creationId xmlns:a16="http://schemas.microsoft.com/office/drawing/2014/main" id="{6DFE7A91-B3DF-4DB3-AF05-5D72E116000F}"/>
+              </a:ext>
+            </a:extLst>
+          </p:cNvPr>
+          <p:cNvCxnSpPr>
+            <a:cxnSpLocks/>
+            <a:endCxn id="28" idx="1"/>
+          </p:cNvCxnSpPr>
+          <p:nvPr/>
+        </p:nvCxnSpPr>
+        <p:spPr>
+          <a:xfrm>
+            <a:off x="1419225" y="681102"/>
+            <a:ext cx="408166" cy="0"/>
+          </a:xfrm>
+          <a:prstGeom prst="straightConnector1">
+            <a:avLst/>
+          </a:prstGeom>
+          <a:ln w="22225">
+            <a:solidFill>
+              <a:schemeClr val="tx1"/>
+            </a:solidFill>
+            <a:tailEnd type="arrow"/>
+          </a:ln>
+        </p:spPr>
+        <p:style>
+          <a:lnRef idx="1">
+            <a:schemeClr val="accent1"/>
+          </a:lnRef>
+          <a:fillRef idx="0">
+            <a:schemeClr val="accent1"/>
+          </a:fillRef>
+          <a:effectRef idx="0">
+            <a:schemeClr val="accent1"/>
+          </a:effectRef>
+          <a:fontRef idx="minor">
+            <a:schemeClr val="tx1"/>
+          </a:fontRef>
+        </p:style>
+      </p:cxnSp>
+      <p:sp>
+        <p:nvSpPr>
+          <p:cNvPr id="114" name="Flowchart: Decision 113">
+            <a:extLst>
+              <a:ext uri="{FF2B5EF4-FFF2-40B4-BE49-F238E27FC236}">
+                <a16:creationId xmlns:a16="http://schemas.microsoft.com/office/drawing/2014/main" id="{3B36B228-8A0B-468B-B66A-E52158BE66DD}"/>
+              </a:ext>
+            </a:extLst>
+          </p:cNvPr>
+          <p:cNvSpPr/>
+          <p:nvPr/>
+        </p:nvSpPr>
+        <p:spPr>
+          <a:xfrm>
+            <a:off x="763492" y="1046291"/>
+            <a:ext cx="666750" cy="438295"/>
+          </a:xfrm>
+          <a:prstGeom prst="flowChartDecision">
+            <a:avLst/>
+          </a:prstGeom>
+          <a:noFill/>
+          <a:ln>
+            <a:solidFill>
+              <a:schemeClr val="tx1"/>
+            </a:solidFill>
+          </a:ln>
+        </p:spPr>
+        <p:style>
+          <a:lnRef idx="2">
+            <a:schemeClr val="accent1">
+              <a:shade val="50000"/>
+            </a:schemeClr>
+          </a:lnRef>
+          <a:fillRef idx="1">
+            <a:schemeClr val="accent1"/>
+          </a:fillRef>
+          <a:effectRef idx="0">
+            <a:schemeClr val="accent1"/>
+          </a:effectRef>
+          <a:fontRef idx="minor">
+            <a:schemeClr val="lt1"/>
+          </a:fontRef>
+        </p:style>
+        <p:txBody>
+          <a:bodyPr rtlCol="0" anchor="ctr"/>
+          <a:lstStyle/>
+          <a:p>
+            <a:pPr algn="ctr"/>
+            <a:endParaRPr lang="en-US">
+              <a:solidFill>
+                <a:schemeClr val="tx1"/>
+              </a:solidFill>
+            </a:endParaRPr>
+          </a:p>
+        </p:txBody>
+      </p:sp>
+      <p:sp>
+        <p:nvSpPr>
+          <p:cNvPr id="115" name="TextBox 114">
+            <a:extLst>
+              <a:ext uri="{FF2B5EF4-FFF2-40B4-BE49-F238E27FC236}">
+                <a16:creationId xmlns:a16="http://schemas.microsoft.com/office/drawing/2014/main" id="{A11606F3-0175-42BE-99ED-A7A59AEB3494}"/>
+              </a:ext>
+            </a:extLst>
+          </p:cNvPr>
+          <p:cNvSpPr txBox="1"/>
+          <p:nvPr/>
+        </p:nvSpPr>
+        <p:spPr>
+          <a:xfrm>
+            <a:off x="752474" y="1129671"/>
+            <a:ext cx="677767" cy="230832"/>
+          </a:xfrm>
+          <a:prstGeom prst="rect">
+            <a:avLst/>
+          </a:prstGeom>
+          <a:noFill/>
+        </p:spPr>
+        <p:txBody>
+          <a:bodyPr wrap="square" rtlCol="0">
+            <a:spAutoFit/>
+          </a:bodyPr>
+          <a:lstStyle/>
+          <a:p>
+            <a:pPr algn="ctr"/>
+            <a:r>
+              <a:rPr lang="en-US" sz="900" dirty="0">
+                <a:cs typeface="Arial" panose="020B0604020202020204" pitchFamily="34" charset="0"/>
+              </a:rPr>
+              <a:t>If DR_LO</a:t>
+            </a:r>
+          </a:p>
+        </p:txBody>
+      </p:sp>
+      <p:cxnSp>
+        <p:nvCxnSpPr>
+          <p:cNvPr id="119" name="Elbow Connector 61">
+            <a:extLst>
+              <a:ext uri="{FF2B5EF4-FFF2-40B4-BE49-F238E27FC236}">
+                <a16:creationId xmlns:a16="http://schemas.microsoft.com/office/drawing/2014/main" id="{19F9311A-E5E4-4BF7-87B0-4CC2E552AB28}"/>
+              </a:ext>
+            </a:extLst>
+          </p:cNvPr>
+          <p:cNvCxnSpPr>
+            <a:cxnSpLocks/>
+            <a:stCxn id="115" idx="1"/>
+            <a:endCxn id="55" idx="0"/>
+          </p:cNvCxnSpPr>
+          <p:nvPr/>
+        </p:nvCxnSpPr>
+        <p:spPr>
+          <a:xfrm rot="10800000" flipV="1">
+            <a:off x="311368" y="1245087"/>
+            <a:ext cx="441106" cy="190416"/>
+          </a:xfrm>
+          <a:prstGeom prst="bentConnector2">
+            <a:avLst/>
+          </a:prstGeom>
+          <a:ln w="22225">
+            <a:solidFill>
+              <a:schemeClr val="tx1"/>
+            </a:solidFill>
+            <a:tailEnd type="arrow"/>
+          </a:ln>
+        </p:spPr>
+        <p:style>
+          <a:lnRef idx="1">
+            <a:schemeClr val="accent1"/>
+          </a:lnRef>
+          <a:fillRef idx="0">
+            <a:schemeClr val="accent1"/>
+          </a:fillRef>
+          <a:effectRef idx="0">
+            <a:schemeClr val="accent1"/>
+          </a:effectRef>
+          <a:fontRef idx="minor">
+            <a:schemeClr val="tx1"/>
+          </a:fontRef>
+        </p:style>
+      </p:cxnSp>
+      <p:sp>
+        <p:nvSpPr>
+          <p:cNvPr id="48" name="TextBox 47">
+            <a:extLst>
+              <a:ext uri="{FF2B5EF4-FFF2-40B4-BE49-F238E27FC236}">
+                <a16:creationId xmlns:a16="http://schemas.microsoft.com/office/drawing/2014/main" id="{32DBE75F-FE36-44B0-BBDB-DE639CED5F87}"/>
+              </a:ext>
+            </a:extLst>
+          </p:cNvPr>
+          <p:cNvSpPr txBox="1"/>
+          <p:nvPr/>
+        </p:nvSpPr>
+        <p:spPr>
+          <a:xfrm>
+            <a:off x="1094519" y="1398766"/>
+            <a:ext cx="552450" cy="276999"/>
+          </a:xfrm>
+          <a:prstGeom prst="rect">
+            <a:avLst/>
+          </a:prstGeom>
+          <a:noFill/>
+        </p:spPr>
+        <p:txBody>
+          <a:bodyPr wrap="square" rtlCol="0">
+            <a:spAutoFit/>
+          </a:bodyPr>
+          <a:lstStyle/>
+          <a:p>
+            <a:r>
+              <a:rPr lang="en-US" sz="1200" dirty="0"/>
+              <a:t>False</a:t>
+            </a:r>
+          </a:p>
+        </p:txBody>
+      </p:sp>
+      <p:cxnSp>
+        <p:nvCxnSpPr>
+          <p:cNvPr id="125" name="Straight Arrow Connector 124">
+            <a:extLst>
+              <a:ext uri="{FF2B5EF4-FFF2-40B4-BE49-F238E27FC236}">
+                <a16:creationId xmlns:a16="http://schemas.microsoft.com/office/drawing/2014/main" id="{461F2363-A645-491A-A54E-EB42387D1F81}"/>
+              </a:ext>
+            </a:extLst>
+          </p:cNvPr>
+          <p:cNvCxnSpPr>
+            <a:cxnSpLocks/>
+            <a:stCxn id="114" idx="2"/>
+            <a:endCxn id="19" idx="0"/>
+          </p:cNvCxnSpPr>
+          <p:nvPr/>
+        </p:nvCxnSpPr>
+        <p:spPr>
+          <a:xfrm flipH="1">
+            <a:off x="1084129" y="1484586"/>
+            <a:ext cx="12738" cy="162709"/>
+          </a:xfrm>
+          <a:prstGeom prst="straightConnector1">
+            <a:avLst/>
+          </a:prstGeom>
+          <a:ln w="22225">
+            <a:solidFill>
+              <a:schemeClr val="tx1"/>
+            </a:solidFill>
+            <a:tailEnd type="arrow"/>
+          </a:ln>
+        </p:spPr>
+        <p:style>
+          <a:lnRef idx="1">
+            <a:schemeClr val="accent1"/>
+          </a:lnRef>
+          <a:fillRef idx="0">
+            <a:schemeClr val="accent1"/>
+          </a:fillRef>
+          <a:effectRef idx="0">
+            <a:schemeClr val="accent1"/>
+          </a:effectRef>
+          <a:fontRef idx="minor">
+            <a:schemeClr val="tx1"/>
+          </a:fontRef>
+        </p:style>
+      </p:cxnSp>
+      <p:sp>
+        <p:nvSpPr>
+          <p:cNvPr id="54" name="TextBox 53">
+            <a:extLst>
+              <a:ext uri="{FF2B5EF4-FFF2-40B4-BE49-F238E27FC236}">
+                <a16:creationId xmlns:a16="http://schemas.microsoft.com/office/drawing/2014/main" id="{0C82D571-EB78-4806-A07F-8153D1DFBE2F}"/>
+              </a:ext>
+            </a:extLst>
+          </p:cNvPr>
+          <p:cNvSpPr txBox="1"/>
+          <p:nvPr/>
+        </p:nvSpPr>
+        <p:spPr>
+          <a:xfrm>
+            <a:off x="87034" y="985485"/>
+            <a:ext cx="533399" cy="276999"/>
+          </a:xfrm>
+          <a:prstGeom prst="rect">
+            <a:avLst/>
+          </a:prstGeom>
+          <a:noFill/>
+        </p:spPr>
+        <p:txBody>
+          <a:bodyPr wrap="square" rtlCol="0">
+            <a:spAutoFit/>
+          </a:bodyPr>
+          <a:lstStyle/>
+          <a:p>
+            <a:r>
+              <a:rPr lang="en-US" sz="1200" dirty="0"/>
+              <a:t>True</a:t>
+            </a:r>
+          </a:p>
+        </p:txBody>
+      </p:sp>
+      <p:sp>
+        <p:nvSpPr>
+          <p:cNvPr id="55" name="Flowchart: Process 54">
+            <a:extLst>
+              <a:ext uri="{FF2B5EF4-FFF2-40B4-BE49-F238E27FC236}">
+                <a16:creationId xmlns:a16="http://schemas.microsoft.com/office/drawing/2014/main" id="{21AAB2BA-84D9-4930-8A33-B189EC21F8BC}"/>
+              </a:ext>
+            </a:extLst>
+          </p:cNvPr>
+          <p:cNvSpPr/>
+          <p:nvPr/>
+        </p:nvSpPr>
+        <p:spPr>
+          <a:xfrm>
+            <a:off x="22034" y="1435503"/>
+            <a:ext cx="578668" cy="539086"/>
+          </a:xfrm>
+          <a:prstGeom prst="flowChartProcess">
+            <a:avLst/>
+          </a:prstGeom>
+          <a:noFill/>
+          <a:ln>
+            <a:solidFill>
+              <a:schemeClr val="tx1"/>
+            </a:solidFill>
+          </a:ln>
+        </p:spPr>
+        <p:style>
+          <a:lnRef idx="2">
+            <a:schemeClr val="accent1">
+              <a:shade val="50000"/>
+            </a:schemeClr>
+          </a:lnRef>
+          <a:fillRef idx="1">
+            <a:schemeClr val="accent1"/>
+          </a:fillRef>
+          <a:effectRef idx="0">
+            <a:schemeClr val="accent1"/>
+          </a:effectRef>
+          <a:fontRef idx="minor">
+            <a:schemeClr val="lt1"/>
+          </a:fontRef>
+        </p:style>
+        <p:txBody>
+          <a:bodyPr rtlCol="0" anchor="ctr"/>
+          <a:lstStyle/>
+          <a:p>
+            <a:pPr algn="ctr"/>
+            <a:r>
+              <a:rPr lang="en-US" sz="1000" dirty="0">
+                <a:solidFill>
+                  <a:schemeClr val="tx1"/>
+                </a:solidFill>
+              </a:rPr>
+              <a:t>Turn off All sources</a:t>
+            </a:r>
+          </a:p>
+        </p:txBody>
+      </p:sp>
+      <p:cxnSp>
+        <p:nvCxnSpPr>
+          <p:cNvPr id="146" name="Straight Arrow Connector 145">
+            <a:extLst>
+              <a:ext uri="{FF2B5EF4-FFF2-40B4-BE49-F238E27FC236}">
+                <a16:creationId xmlns:a16="http://schemas.microsoft.com/office/drawing/2014/main" id="{319B7ADB-323A-4BDB-8C7B-5E383787EEDD}"/>
+              </a:ext>
+            </a:extLst>
+          </p:cNvPr>
+          <p:cNvCxnSpPr>
+            <a:cxnSpLocks/>
+            <a:stCxn id="55" idx="2"/>
+          </p:cNvCxnSpPr>
+          <p:nvPr/>
+        </p:nvCxnSpPr>
+        <p:spPr>
+          <a:xfrm flipH="1">
+            <a:off x="304799" y="1974589"/>
+            <a:ext cx="6569" cy="372138"/>
+          </a:xfrm>
+          <a:prstGeom prst="straightConnector1">
+            <a:avLst/>
+          </a:prstGeom>
+          <a:ln w="22225">
+            <a:solidFill>
+              <a:schemeClr val="tx1"/>
+            </a:solidFill>
+            <a:tailEnd type="arrow"/>
+          </a:ln>
+        </p:spPr>
+        <p:style>
+          <a:lnRef idx="1">
+            <a:schemeClr val="accent1"/>
+          </a:lnRef>
+          <a:fillRef idx="0">
+            <a:schemeClr val="accent1"/>
+          </a:fillRef>
+          <a:effectRef idx="0">
+            <a:schemeClr val="accent1"/>
+          </a:effectRef>
+          <a:fontRef idx="minor">
+            <a:schemeClr val="tx1"/>
+          </a:fontRef>
+        </p:style>
+      </p:cxnSp>
+      <p:sp>
+        <p:nvSpPr>
+          <p:cNvPr id="80" name="Flowchart: Decision 79">
+            <a:extLst>
+              <a:ext uri="{FF2B5EF4-FFF2-40B4-BE49-F238E27FC236}">
+                <a16:creationId xmlns:a16="http://schemas.microsoft.com/office/drawing/2014/main" id="{1A1FA985-6E3E-43A1-A053-654787A4A9D3}"/>
+              </a:ext>
+            </a:extLst>
+          </p:cNvPr>
+          <p:cNvSpPr/>
+          <p:nvPr/>
+        </p:nvSpPr>
+        <p:spPr>
+          <a:xfrm>
+            <a:off x="6812440" y="3634204"/>
+            <a:ext cx="1104900" cy="685800"/>
+          </a:xfrm>
+          <a:prstGeom prst="flowChartDecision">
+            <a:avLst/>
+          </a:prstGeom>
+          <a:noFill/>
+          <a:ln>
+            <a:solidFill>
+              <a:schemeClr val="tx1"/>
+            </a:solidFill>
+          </a:ln>
+        </p:spPr>
+        <p:style>
+          <a:lnRef idx="2">
+            <a:schemeClr val="accent1">
+              <a:shade val="50000"/>
+            </a:schemeClr>
+          </a:lnRef>
+          <a:fillRef idx="1">
+            <a:schemeClr val="accent1"/>
+          </a:fillRef>
+          <a:effectRef idx="0">
+            <a:schemeClr val="accent1"/>
+          </a:effectRef>
+          <a:fontRef idx="minor">
+            <a:schemeClr val="lt1"/>
+          </a:fontRef>
+        </p:style>
+        <p:txBody>
+          <a:bodyPr rtlCol="0" anchor="ctr"/>
+          <a:lstStyle/>
+          <a:p>
+            <a:pPr algn="ctr"/>
+            <a:endParaRPr lang="en-US">
+              <a:solidFill>
+                <a:schemeClr val="tx1"/>
+              </a:solidFill>
+            </a:endParaRPr>
+          </a:p>
+        </p:txBody>
+      </p:sp>
+      <p:sp>
+        <p:nvSpPr>
+          <p:cNvPr id="83" name="TextBox 82">
+            <a:extLst>
+              <a:ext uri="{FF2B5EF4-FFF2-40B4-BE49-F238E27FC236}">
+                <a16:creationId xmlns:a16="http://schemas.microsoft.com/office/drawing/2014/main" id="{0802128D-2284-44BE-AB64-65CDB18FC2E0}"/>
+              </a:ext>
+            </a:extLst>
+          </p:cNvPr>
+          <p:cNvSpPr txBox="1"/>
+          <p:nvPr/>
+        </p:nvSpPr>
+        <p:spPr>
+          <a:xfrm>
+            <a:off x="7883099" y="3710264"/>
+            <a:ext cx="533399" cy="276999"/>
+          </a:xfrm>
+          <a:prstGeom prst="rect">
+            <a:avLst/>
+          </a:prstGeom>
+          <a:noFill/>
+        </p:spPr>
+        <p:txBody>
+          <a:bodyPr wrap="square" rtlCol="0">
+            <a:spAutoFit/>
+          </a:bodyPr>
+          <a:lstStyle/>
+          <a:p>
+            <a:r>
+              <a:rPr lang="en-US" sz="1200" dirty="0"/>
+              <a:t>True</a:t>
+            </a:r>
+          </a:p>
+        </p:txBody>
+      </p:sp>
+      <p:cxnSp>
+        <p:nvCxnSpPr>
+          <p:cNvPr id="158" name="Elbow Connector 108">
+            <a:extLst>
+              <a:ext uri="{FF2B5EF4-FFF2-40B4-BE49-F238E27FC236}">
+                <a16:creationId xmlns:a16="http://schemas.microsoft.com/office/drawing/2014/main" id="{6933683B-3B07-4442-A8B7-4EBCE46ECAD9}"/>
+              </a:ext>
+            </a:extLst>
+          </p:cNvPr>
+          <p:cNvCxnSpPr>
+            <a:cxnSpLocks/>
+            <a:stCxn id="80" idx="3"/>
+            <a:endCxn id="127" idx="0"/>
+          </p:cNvCxnSpPr>
+          <p:nvPr/>
+        </p:nvCxnSpPr>
+        <p:spPr>
+          <a:xfrm>
+            <a:off x="7917340" y="3977104"/>
+            <a:ext cx="622075" cy="350629"/>
+          </a:xfrm>
+          <a:prstGeom prst="bentConnector2">
+            <a:avLst/>
+          </a:prstGeom>
+          <a:ln w="22225">
+            <a:solidFill>
+              <a:schemeClr val="tx1"/>
+            </a:solidFill>
+            <a:tailEnd type="arrow"/>
+          </a:ln>
+        </p:spPr>
+        <p:style>
+          <a:lnRef idx="1">
+            <a:schemeClr val="accent1"/>
+          </a:lnRef>
+          <a:fillRef idx="0">
+            <a:schemeClr val="accent1"/>
+          </a:fillRef>
+          <a:effectRef idx="0">
+            <a:schemeClr val="accent1"/>
+          </a:effectRef>
+          <a:fontRef idx="minor">
+            <a:schemeClr val="tx1"/>
+          </a:fontRef>
+        </p:style>
+      </p:cxnSp>
+      <p:sp>
+        <p:nvSpPr>
+          <p:cNvPr id="92" name="TextBox 91">
+            <a:extLst>
+              <a:ext uri="{FF2B5EF4-FFF2-40B4-BE49-F238E27FC236}">
+                <a16:creationId xmlns:a16="http://schemas.microsoft.com/office/drawing/2014/main" id="{A4739F6F-B2AE-4F4E-B176-5E74D5DC877E}"/>
+              </a:ext>
+            </a:extLst>
+          </p:cNvPr>
+          <p:cNvSpPr txBox="1"/>
+          <p:nvPr/>
+        </p:nvSpPr>
+        <p:spPr>
+          <a:xfrm>
+            <a:off x="6919424" y="4293333"/>
+            <a:ext cx="552450" cy="276999"/>
+          </a:xfrm>
+          <a:prstGeom prst="rect">
+            <a:avLst/>
+          </a:prstGeom>
+          <a:noFill/>
+        </p:spPr>
+        <p:txBody>
+          <a:bodyPr wrap="square" rtlCol="0">
+            <a:spAutoFit/>
+          </a:bodyPr>
+          <a:lstStyle/>
+          <a:p>
+            <a:r>
+              <a:rPr lang="en-US" sz="1200" dirty="0"/>
+              <a:t>False</a:t>
+            </a:r>
+          </a:p>
+        </p:txBody>
+      </p:sp>
+      <p:sp>
+        <p:nvSpPr>
+          <p:cNvPr id="93" name="TextBox 92">
+            <a:extLst>
+              <a:ext uri="{FF2B5EF4-FFF2-40B4-BE49-F238E27FC236}">
+                <a16:creationId xmlns:a16="http://schemas.microsoft.com/office/drawing/2014/main" id="{9BE3A886-A261-4882-B1DA-16D9D49C8793}"/>
+              </a:ext>
+            </a:extLst>
+          </p:cNvPr>
+          <p:cNvSpPr txBox="1"/>
+          <p:nvPr/>
+        </p:nvSpPr>
+        <p:spPr>
+          <a:xfrm>
+            <a:off x="6869590" y="3773220"/>
+            <a:ext cx="990600" cy="430887"/>
+          </a:xfrm>
+          <a:prstGeom prst="rect">
+            <a:avLst/>
+          </a:prstGeom>
+          <a:noFill/>
+        </p:spPr>
+        <p:txBody>
+          <a:bodyPr wrap="square" rtlCol="0">
+            <a:spAutoFit/>
+          </a:bodyPr>
+          <a:lstStyle/>
+          <a:p>
+            <a:pPr algn="ctr"/>
+            <a:r>
+              <a:rPr lang="en-US" sz="1100" dirty="0"/>
+              <a:t>Should DR Lockout</a:t>
+            </a:r>
+          </a:p>
+        </p:txBody>
+      </p:sp>
+      <p:cxnSp>
+        <p:nvCxnSpPr>
+          <p:cNvPr id="181" name="Straight Arrow Connector 180">
+            <a:extLst>
+              <a:ext uri="{FF2B5EF4-FFF2-40B4-BE49-F238E27FC236}">
+                <a16:creationId xmlns:a16="http://schemas.microsoft.com/office/drawing/2014/main" id="{5C8EBE36-0CA0-4B19-8E81-A17A28D2947D}"/>
+              </a:ext>
+            </a:extLst>
+          </p:cNvPr>
+          <p:cNvCxnSpPr>
+            <a:cxnSpLocks/>
+            <a:stCxn id="80" idx="2"/>
+            <a:endCxn id="16" idx="0"/>
+          </p:cNvCxnSpPr>
+          <p:nvPr/>
+        </p:nvCxnSpPr>
+        <p:spPr>
+          <a:xfrm>
+            <a:off x="7364890" y="4320004"/>
+            <a:ext cx="5395" cy="372306"/>
+          </a:xfrm>
+          <a:prstGeom prst="straightConnector1">
+            <a:avLst/>
+          </a:prstGeom>
+          <a:ln w="22225">
+            <a:solidFill>
+              <a:schemeClr val="tx1"/>
+            </a:solidFill>
+            <a:tailEnd type="arrow"/>
+          </a:ln>
+        </p:spPr>
+        <p:style>
+          <a:lnRef idx="1">
+            <a:schemeClr val="accent1"/>
+          </a:lnRef>
+          <a:fillRef idx="0">
+            <a:schemeClr val="accent1"/>
+          </a:fillRef>
+          <a:effectRef idx="0">
+            <a:schemeClr val="accent1"/>
+          </a:effectRef>
+          <a:fontRef idx="minor">
+            <a:schemeClr val="tx1"/>
+          </a:fontRef>
+        </p:style>
+      </p:cxnSp>
+      <p:sp>
+        <p:nvSpPr>
+          <p:cNvPr id="127" name="Flowchart: Process 126">
+            <a:extLst>
+              <a:ext uri="{FF2B5EF4-FFF2-40B4-BE49-F238E27FC236}">
+                <a16:creationId xmlns:a16="http://schemas.microsoft.com/office/drawing/2014/main" id="{2674AFA1-5168-47CC-A4AC-7C797A987AC0}"/>
+              </a:ext>
+            </a:extLst>
+          </p:cNvPr>
+          <p:cNvSpPr/>
+          <p:nvPr/>
+        </p:nvSpPr>
+        <p:spPr>
+          <a:xfrm>
+            <a:off x="8082215" y="4327733"/>
+            <a:ext cx="914400" cy="313787"/>
+          </a:xfrm>
+          <a:prstGeom prst="flowChartProcess">
+            <a:avLst/>
+          </a:prstGeom>
+          <a:noFill/>
+          <a:ln>
+            <a:solidFill>
+              <a:schemeClr val="tx1"/>
+            </a:solidFill>
+          </a:ln>
+        </p:spPr>
+        <p:style>
+          <a:lnRef idx="2">
+            <a:schemeClr val="accent1">
+              <a:shade val="50000"/>
+            </a:schemeClr>
+          </a:lnRef>
+          <a:fillRef idx="1">
+            <a:schemeClr val="accent1"/>
+          </a:fillRef>
+          <a:effectRef idx="0">
+            <a:schemeClr val="accent1"/>
+          </a:effectRef>
+          <a:fontRef idx="minor">
+            <a:schemeClr val="lt1"/>
+          </a:fontRef>
+        </p:style>
+        <p:txBody>
+          <a:bodyPr rtlCol="0" anchor="ctr"/>
+          <a:lstStyle/>
+          <a:p>
+            <a:pPr algn="ctr"/>
+            <a:r>
+              <a:rPr lang="en-US" sz="1100" dirty="0">
+                <a:solidFill>
+                  <a:schemeClr val="tx1"/>
+                </a:solidFill>
+              </a:rPr>
+              <a:t>Engage Compressor</a:t>
+            </a:r>
+          </a:p>
+        </p:txBody>
+      </p:sp>
+      <p:cxnSp>
+        <p:nvCxnSpPr>
+          <p:cNvPr id="195" name="Elbow Connector 119">
+            <a:extLst>
+              <a:ext uri="{FF2B5EF4-FFF2-40B4-BE49-F238E27FC236}">
+                <a16:creationId xmlns:a16="http://schemas.microsoft.com/office/drawing/2014/main" id="{CCD2B5D3-92D1-4B06-8D14-49C5A7F580DA}"/>
+              </a:ext>
+            </a:extLst>
+          </p:cNvPr>
+          <p:cNvCxnSpPr>
+            <a:cxnSpLocks/>
+            <a:stCxn id="127" idx="2"/>
+          </p:cNvCxnSpPr>
+          <p:nvPr/>
+        </p:nvCxnSpPr>
+        <p:spPr>
+          <a:xfrm rot="5400000">
+            <a:off x="7116578" y="4894143"/>
+            <a:ext cx="1675460" cy="1170214"/>
+          </a:xfrm>
+          <a:prstGeom prst="bentConnector3">
+            <a:avLst>
+              <a:gd name="adj1" fmla="val 100028"/>
+            </a:avLst>
+          </a:prstGeom>
+          <a:ln w="22225">
+            <a:solidFill>
+              <a:schemeClr val="tx1"/>
+            </a:solidFill>
+            <a:tailEnd type="arrow"/>
+          </a:ln>
+        </p:spPr>
+        <p:style>
+          <a:lnRef idx="1">
+            <a:schemeClr val="accent1"/>
+          </a:lnRef>
+          <a:fillRef idx="0">
+            <a:schemeClr val="accent1"/>
+          </a:fillRef>
+          <a:effectRef idx="0">
+            <a:schemeClr val="accent1"/>
+          </a:effectRef>
+          <a:fontRef idx="minor">
+            <a:schemeClr val="tx1"/>
+          </a:fontRef>
+        </p:style>
+      </p:cxnSp>
     </p:spTree>
     <p:extLst>
       <p:ext uri="{BB962C8B-B14F-4D97-AF65-F5344CB8AC3E}">
@@ -5743,18 +6798,13 @@
           <a:p>
             <a:pPr algn="ctr"/>
             <a:r>
-              <a:rPr lang="en-US" dirty="0" smtClean="0">
+              <a:rPr lang="en-US" dirty="0">
                 <a:solidFill>
                   <a:schemeClr val="tx1"/>
                 </a:solidFill>
               </a:rPr>
               <a:t>Start</a:t>
             </a:r>
-            <a:endParaRPr lang="en-US" dirty="0">
-              <a:solidFill>
-                <a:schemeClr val="tx1"/>
-              </a:solidFill>
-            </a:endParaRPr>
           </a:p>
         </p:txBody>
       </p:sp>
@@ -5801,18 +6851,13 @@
           <a:p>
             <a:pPr algn="ctr"/>
             <a:r>
-              <a:rPr lang="en-US" dirty="0" smtClean="0">
+              <a:rPr lang="en-US" dirty="0">
                 <a:solidFill>
                   <a:schemeClr val="tx1"/>
                 </a:solidFill>
               </a:rPr>
               <a:t>End</a:t>
             </a:r>
-            <a:endParaRPr lang="en-US" dirty="0">
-              <a:solidFill>
-                <a:schemeClr val="tx1"/>
-              </a:solidFill>
-            </a:endParaRPr>
           </a:p>
         </p:txBody>
       </p:sp>
@@ -5916,10 +6961,9 @@
           <a:lstStyle/>
           <a:p>
             <a:r>
-              <a:rPr lang="en-US" dirty="0" smtClean="0"/>
+              <a:rPr lang="en-US" dirty="0"/>
               <a:t>Should Heat</a:t>
             </a:r>
-            <a:endParaRPr lang="en-US" dirty="0"/>
           </a:p>
         </p:txBody>
       </p:sp>
@@ -5998,13 +7042,8 @@
             <a:pPr algn="ctr"/>
             <a:r>
               <a:rPr lang="en-US" sz="900" dirty="0"/>
-              <a:t>Switch on logic evaluates to </a:t>
-            </a:r>
-            <a:r>
-              <a:rPr lang="en-US" sz="900" dirty="0" smtClean="0"/>
-              <a:t>true</a:t>
-            </a:r>
-            <a:endParaRPr lang="en-US" sz="900" dirty="0"/>
+              <a:t>Switch on logic evaluates to true</a:t>
+            </a:r>
           </a:p>
         </p:txBody>
       </p:sp>
@@ -6051,7 +7090,7 @@
           <a:p>
             <a:pPr algn="ctr"/>
             <a:r>
-              <a:rPr lang="en-US" sz="1000" dirty="0" err="1" smtClean="0">
+              <a:rPr lang="en-US" sz="1000" dirty="0" err="1">
                 <a:solidFill>
                   <a:schemeClr val="tx1"/>
                 </a:solidFill>
@@ -6059,18 +7098,13 @@
               <a:t>shouldEngage</a:t>
             </a:r>
             <a:r>
-              <a:rPr lang="en-US" sz="1000" dirty="0" smtClean="0">
+              <a:rPr lang="en-US" sz="1000" dirty="0">
                 <a:solidFill>
                   <a:schemeClr val="tx1"/>
                 </a:solidFill>
               </a:rPr>
               <a:t> = true</a:t>
             </a:r>
-            <a:endParaRPr lang="en-US" sz="1000" dirty="0">
-              <a:solidFill>
-                <a:schemeClr val="tx1"/>
-              </a:solidFill>
-            </a:endParaRPr>
           </a:p>
         </p:txBody>
       </p:sp>
@@ -6098,22 +7132,21 @@
           <a:p>
             <a:pPr algn="ctr"/>
             <a:r>
-              <a:rPr lang="en-US" sz="900" dirty="0" err="1" smtClean="0"/>
+              <a:rPr lang="en-US" sz="900" dirty="0" err="1"/>
               <a:t>shouldEngage</a:t>
             </a:r>
             <a:r>
-              <a:rPr lang="en-US" sz="900" dirty="0" smtClean="0"/>
+              <a:rPr lang="en-US" sz="900" dirty="0"/>
               <a:t> is true &amp;&amp; </a:t>
             </a:r>
             <a:r>
-              <a:rPr lang="en-US" sz="900" dirty="0" err="1" smtClean="0"/>
+              <a:rPr lang="en-US" sz="900" dirty="0" err="1"/>
               <a:t>shutsOff</a:t>
             </a:r>
             <a:r>
-              <a:rPr lang="en-US" sz="900" dirty="0" smtClean="0"/>
+              <a:rPr lang="en-US" sz="900" dirty="0"/>
               <a:t> is true</a:t>
             </a:r>
-            <a:endParaRPr lang="en-US" sz="900" dirty="0"/>
           </a:p>
         </p:txBody>
       </p:sp>
@@ -6210,7 +7243,7 @@
           <a:p>
             <a:pPr algn="ctr"/>
             <a:r>
-              <a:rPr lang="en-US" sz="1000" dirty="0" err="1" smtClean="0">
+              <a:rPr lang="en-US" sz="1000" dirty="0" err="1">
                 <a:solidFill>
                   <a:schemeClr val="tx1"/>
                 </a:solidFill>
@@ -6218,18 +7251,13 @@
               <a:t>shouldEngage</a:t>
             </a:r>
             <a:r>
-              <a:rPr lang="en-US" sz="1000" dirty="0" smtClean="0">
+              <a:rPr lang="en-US" sz="1000" dirty="0">
                 <a:solidFill>
                   <a:schemeClr val="tx1"/>
                 </a:solidFill>
               </a:rPr>
               <a:t> = false</a:t>
             </a:r>
-            <a:endParaRPr lang="en-US" sz="1000" dirty="0">
-              <a:solidFill>
-                <a:schemeClr val="tx1"/>
-              </a:solidFill>
-            </a:endParaRPr>
           </a:p>
         </p:txBody>
       </p:sp>
@@ -6276,7 +7304,7 @@
           <a:p>
             <a:pPr algn="ctr"/>
             <a:r>
-              <a:rPr lang="en-US" sz="1000" dirty="0" smtClean="0">
+              <a:rPr lang="en-US" sz="1000" dirty="0">
                 <a:solidFill>
                   <a:schemeClr val="tx1"/>
                 </a:solidFill>
@@ -6284,7 +7312,7 @@
               <a:t>Return </a:t>
             </a:r>
             <a:r>
-              <a:rPr lang="en-US" sz="1000" dirty="0" err="1" smtClean="0">
+              <a:rPr lang="en-US" sz="1000" dirty="0" err="1">
                 <a:solidFill>
                   <a:schemeClr val="tx1"/>
                 </a:solidFill>
@@ -6292,18 +7320,13 @@
               <a:t>shouldEngage</a:t>
             </a:r>
             <a:r>
-              <a:rPr lang="en-US" sz="1000" dirty="0" smtClean="0">
+              <a:rPr lang="en-US" sz="1000" dirty="0">
                 <a:solidFill>
                   <a:schemeClr val="tx1"/>
                 </a:solidFill>
               </a:rPr>
               <a:t> </a:t>
             </a:r>
-            <a:endParaRPr lang="en-US" sz="1000" dirty="0">
-              <a:solidFill>
-                <a:schemeClr val="tx1"/>
-              </a:solidFill>
-            </a:endParaRPr>
           </a:p>
         </p:txBody>
       </p:sp>
@@ -6563,7 +7586,7 @@
           <a:lstStyle/>
           <a:p>
             <a:r>
-              <a:rPr lang="en-US" sz="1200" dirty="0" smtClean="0"/>
+              <a:rPr lang="en-US" sz="1200" dirty="0"/>
               <a:t>True</a:t>
             </a:r>
           </a:p>
@@ -6592,7 +7615,7 @@
           <a:lstStyle/>
           <a:p>
             <a:r>
-              <a:rPr lang="en-US" sz="1200" dirty="0" smtClean="0"/>
+              <a:rPr lang="en-US" sz="1200" dirty="0"/>
               <a:t>False</a:t>
             </a:r>
           </a:p>
@@ -6621,7 +7644,7 @@
           <a:lstStyle/>
           <a:p>
             <a:r>
-              <a:rPr lang="en-US" sz="1200" dirty="0" smtClean="0"/>
+              <a:rPr lang="en-US" sz="1200" dirty="0"/>
               <a:t>False</a:t>
             </a:r>
           </a:p>
@@ -6650,7 +7673,7 @@
           <a:lstStyle/>
           <a:p>
             <a:r>
-              <a:rPr lang="en-US" sz="1200" dirty="0" smtClean="0"/>
+              <a:rPr lang="en-US" sz="1200" dirty="0"/>
               <a:t>True</a:t>
             </a:r>
           </a:p>
@@ -6699,7 +7722,7 @@
           <a:p>
             <a:pPr algn="ctr"/>
             <a:r>
-              <a:rPr lang="en-US" sz="1000" dirty="0" err="1" smtClean="0">
+              <a:rPr lang="en-US" sz="1000" dirty="0" err="1">
                 <a:solidFill>
                   <a:schemeClr val="tx1"/>
                 </a:solidFill>
@@ -6707,18 +7730,13 @@
               <a:t>shouldEngage</a:t>
             </a:r>
             <a:r>
-              <a:rPr lang="en-US" sz="1000" dirty="0" smtClean="0">
+              <a:rPr lang="en-US" sz="1000" dirty="0">
                 <a:solidFill>
                   <a:schemeClr val="tx1"/>
                 </a:solidFill>
               </a:rPr>
               <a:t> = false</a:t>
             </a:r>
-            <a:endParaRPr lang="en-US" sz="1000" dirty="0">
-              <a:solidFill>
-                <a:schemeClr val="tx1"/>
-              </a:solidFill>
-            </a:endParaRPr>
           </a:p>
         </p:txBody>
       </p:sp>
@@ -6804,18 +7822,13 @@
           <a:p>
             <a:pPr algn="ctr"/>
             <a:r>
-              <a:rPr lang="en-US" dirty="0" smtClean="0">
+              <a:rPr lang="en-US" dirty="0">
                 <a:solidFill>
                   <a:schemeClr val="tx1"/>
                 </a:solidFill>
               </a:rPr>
               <a:t>Start</a:t>
             </a:r>
-            <a:endParaRPr lang="en-US" dirty="0">
-              <a:solidFill>
-                <a:schemeClr val="tx1"/>
-              </a:solidFill>
-            </a:endParaRPr>
           </a:p>
         </p:txBody>
       </p:sp>
@@ -6862,18 +7875,13 @@
           <a:p>
             <a:pPr algn="ctr"/>
             <a:r>
-              <a:rPr lang="en-US" dirty="0" smtClean="0">
+              <a:rPr lang="en-US" dirty="0">
                 <a:solidFill>
                   <a:schemeClr val="tx1"/>
                 </a:solidFill>
               </a:rPr>
               <a:t>End</a:t>
             </a:r>
-            <a:endParaRPr lang="en-US" dirty="0">
-              <a:solidFill>
-                <a:schemeClr val="tx1"/>
-              </a:solidFill>
-            </a:endParaRPr>
           </a:p>
         </p:txBody>
       </p:sp>
@@ -6881,14 +7889,15 @@
         <p:nvCxnSpPr>
           <p:cNvPr id="55" name="Elbow Connector 54"/>
           <p:cNvCxnSpPr>
+            <a:cxnSpLocks/>
             <a:stCxn id="63" idx="2"/>
           </p:cNvCxnSpPr>
           <p:nvPr/>
         </p:nvCxnSpPr>
         <p:spPr>
           <a:xfrm rot="5400000">
-            <a:off x="6552726" y="3273283"/>
-            <a:ext cx="758140" cy="2572495"/>
+            <a:off x="6577159" y="3272697"/>
+            <a:ext cx="748370" cy="2599382"/>
           </a:xfrm>
           <a:prstGeom prst="bentConnector2">
             <a:avLst/>
@@ -6977,10 +7986,9 @@
           <a:lstStyle/>
           <a:p>
             <a:r>
-              <a:rPr lang="en-US" dirty="0" smtClean="0"/>
+              <a:rPr lang="en-US" dirty="0"/>
               <a:t>Engage Heat Source</a:t>
             </a:r>
-            <a:endParaRPr lang="en-US" dirty="0"/>
           </a:p>
         </p:txBody>
       </p:sp>
@@ -7058,18 +8066,17 @@
           <a:p>
             <a:pPr algn="ctr"/>
             <a:r>
-              <a:rPr lang="en-US" sz="900" dirty="0" smtClean="0"/>
+              <a:rPr lang="en-US" sz="900" dirty="0"/>
               <a:t>Companion </a:t>
             </a:r>
             <a:r>
-              <a:rPr lang="en-US" sz="900" dirty="0" err="1" smtClean="0"/>
+              <a:rPr lang="en-US" sz="900" dirty="0" err="1"/>
               <a:t>HeatSource</a:t>
             </a:r>
             <a:r>
-              <a:rPr lang="en-US" sz="900" dirty="0" smtClean="0"/>
+              <a:rPr lang="en-US" sz="900" dirty="0"/>
               <a:t> exists</a:t>
             </a:r>
-            <a:endParaRPr lang="en-US" sz="900" dirty="0"/>
           </a:p>
         </p:txBody>
       </p:sp>
@@ -7081,7 +8088,7 @@
         </p:nvSpPr>
         <p:spPr>
           <a:xfrm>
-            <a:off x="7760843" y="3875660"/>
+            <a:off x="7793835" y="3893403"/>
             <a:ext cx="914400" cy="304800"/>
           </a:xfrm>
           <a:prstGeom prst="flowChartProcess">
@@ -7116,18 +8123,13 @@
           <a:p>
             <a:pPr algn="ctr"/>
             <a:r>
-              <a:rPr lang="en-US" sz="1000" dirty="0" smtClean="0">
+              <a:rPr lang="en-US" sz="1000" dirty="0">
                 <a:solidFill>
                   <a:schemeClr val="tx1"/>
                 </a:solidFill>
               </a:rPr>
               <a:t>Engage companion</a:t>
             </a:r>
-            <a:endParaRPr lang="en-US" sz="1000" dirty="0">
-              <a:solidFill>
-                <a:schemeClr val="tx1"/>
-              </a:solidFill>
-            </a:endParaRPr>
           </a:p>
         </p:txBody>
       </p:sp>
@@ -7174,6 +8176,7 @@
         <p:nvCxnSpPr>
           <p:cNvPr id="67" name="Elbow Connector 66"/>
           <p:cNvCxnSpPr>
+            <a:cxnSpLocks/>
             <a:stCxn id="81" idx="3"/>
             <a:endCxn id="63" idx="0"/>
           </p:cNvCxnSpPr>
@@ -7182,7 +8185,7 @@
         <p:spPr>
           <a:xfrm>
             <a:off x="8034670" y="2940268"/>
-            <a:ext cx="183373" cy="935392"/>
+            <a:ext cx="216365" cy="953135"/>
           </a:xfrm>
           <a:prstGeom prst="bentConnector2">
             <a:avLst/>
@@ -7271,7 +8274,7 @@
           <a:lstStyle/>
           <a:p>
             <a:r>
-              <a:rPr lang="en-US" sz="1200" dirty="0" smtClean="0"/>
+              <a:rPr lang="en-US" sz="1200" dirty="0"/>
               <a:t>True</a:t>
             </a:r>
           </a:p>
@@ -7285,7 +8288,7 @@
         </p:nvSpPr>
         <p:spPr>
           <a:xfrm>
-            <a:off x="5121825" y="3167070"/>
+            <a:off x="5117958" y="3240217"/>
             <a:ext cx="552450" cy="276999"/>
           </a:xfrm>
           <a:prstGeom prst="rect">
@@ -7300,7 +8303,7 @@
           <a:lstStyle/>
           <a:p>
             <a:r>
-              <a:rPr lang="en-US" sz="1200" dirty="0" smtClean="0"/>
+              <a:rPr lang="en-US" sz="1200" dirty="0"/>
               <a:t>False</a:t>
             </a:r>
           </a:p>
@@ -7329,7 +8332,7 @@
           <a:lstStyle/>
           <a:p>
             <a:r>
-              <a:rPr lang="en-US" sz="1200" dirty="0" smtClean="0"/>
+              <a:rPr lang="en-US" sz="1200" dirty="0"/>
               <a:t>False</a:t>
             </a:r>
           </a:p>
@@ -7358,7 +8361,7 @@
           <a:lstStyle/>
           <a:p>
             <a:r>
-              <a:rPr lang="en-US" sz="1200" dirty="0" smtClean="0"/>
+              <a:rPr lang="en-US" sz="1200" dirty="0"/>
               <a:t>True</a:t>
             </a:r>
           </a:p>
@@ -7407,18 +8410,13 @@
           <a:p>
             <a:pPr algn="ctr"/>
             <a:r>
-              <a:rPr lang="en-US" sz="1000" dirty="0" smtClean="0">
+              <a:rPr lang="en-US" sz="1000" dirty="0">
                 <a:solidFill>
                   <a:schemeClr val="tx1"/>
                 </a:solidFill>
               </a:rPr>
               <a:t>Engage heat source</a:t>
             </a:r>
-            <a:endParaRPr lang="en-US" sz="1000" dirty="0">
-              <a:solidFill>
-                <a:schemeClr val="tx1"/>
-              </a:solidFill>
-            </a:endParaRPr>
           </a:p>
         </p:txBody>
       </p:sp>
@@ -7469,8 +8467,8 @@
         </p:nvSpPr>
         <p:spPr>
           <a:xfrm>
-            <a:off x="6900746" y="2667437"/>
-            <a:ext cx="879076" cy="507831"/>
+            <a:off x="6912372" y="2593886"/>
+            <a:ext cx="879076" cy="646331"/>
           </a:xfrm>
           <a:prstGeom prst="rect">
             <a:avLst/>
@@ -7485,18 +8483,17 @@
           <a:p>
             <a:pPr algn="ctr"/>
             <a:r>
-              <a:rPr lang="en-US" sz="900" dirty="0" smtClean="0"/>
+              <a:rPr lang="en-US" sz="900" dirty="0"/>
               <a:t>Companion </a:t>
             </a:r>
             <a:r>
-              <a:rPr lang="en-US" sz="900" dirty="0" err="1" smtClean="0"/>
+              <a:rPr lang="en-US" sz="900" dirty="0" err="1"/>
               <a:t>shutsOff</a:t>
             </a:r>
             <a:r>
-              <a:rPr lang="en-US" sz="900" dirty="0" smtClean="0"/>
-              <a:t> is false</a:t>
-            </a:r>
-            <a:endParaRPr lang="en-US" sz="900" dirty="0"/>
+              <a:rPr lang="en-US" sz="900" dirty="0"/>
+              <a:t> is false &amp;&amp; not DR locked out</a:t>
+            </a:r>
           </a:p>
         </p:txBody>
       </p:sp>

</xml_diff>